<commit_message>
gs-client unit tests, LogWriter class
</commit_message>
<xml_diff>
--- a/documentation/grooming-salon.pptx
+++ b/documentation/grooming-salon.pptx
@@ -12,8 +12,11 @@
     <p:sldId id="260" r:id="rId6"/>
     <p:sldId id="261" r:id="rId7"/>
     <p:sldId id="262" r:id="rId8"/>
-    <p:sldId id="263" r:id="rId9"/>
-    <p:sldId id="264" r:id="rId10"/>
+    <p:sldId id="266" r:id="rId9"/>
+    <p:sldId id="263" r:id="rId10"/>
+    <p:sldId id="265" r:id="rId11"/>
+    <p:sldId id="268" r:id="rId12"/>
+    <p:sldId id="267" r:id="rId13"/>
   </p:sldIdLst>
   <p:sldSz cx="12192000" cy="6858000"/>
   <p:notesSz cx="6858000" cy="9144000"/>
@@ -128,12 +131,23 @@
             <p14:sldId id="260"/>
             <p14:sldId id="261"/>
             <p14:sldId id="262"/>
+            <p14:sldId id="266"/>
           </p14:sldIdLst>
         </p14:section>
         <p14:section name="База данных" id="{2492EA2E-D884-43AC-8CCB-543BF8ED5670}">
           <p14:sldIdLst>
             <p14:sldId id="263"/>
-            <p14:sldId id="264"/>
+          </p14:sldIdLst>
+        </p14:section>
+        <p14:section name="Логирование" id="{AC9191C3-9635-4761-8EE6-1DBA675AAD05}">
+          <p14:sldIdLst>
+            <p14:sldId id="265"/>
+          </p14:sldIdLst>
+        </p14:section>
+        <p14:section name="Заключение" id="{941A8F3C-F6D5-4BE4-8602-FE222B693A0F}">
+          <p14:sldIdLst>
+            <p14:sldId id="268"/>
+            <p14:sldId id="267"/>
           </p14:sldIdLst>
         </p14:section>
       </p14:sectionLst>
@@ -202,7 +216,7 @@
           <a:noFill/>
           <a:extLst>
             <a:ext uri="{909E8E84-426E-40dd-AFC4-6F175D3DCCD1}">
-              <a14:hiddenFill xmlns="" xmlns:a14="http://schemas.microsoft.com/office/drawing/2010/main">
+              <a14:hiddenFill xmlns:a14="http://schemas.microsoft.com/office/drawing/2010/main" xmlns="">
                 <a:solidFill>
                   <a:srgbClr val="FFFFFF"/>
                 </a:solidFill>
@@ -262,7 +276,7 @@
             </a:ln>
             <a:extLst>
               <a:ext uri="{91240B29-F687-4f45-9708-019B960494DF}">
-                <a14:hiddenLine xmlns="" xmlns:a14="http://schemas.microsoft.com/office/drawing/2010/main" w="9525">
+                <a14:hiddenLine xmlns:a14="http://schemas.microsoft.com/office/drawing/2010/main" xmlns="" w="9525">
                   <a:solidFill>
                     <a:srgbClr val="000000"/>
                   </a:solidFill>
@@ -352,7 +366,7 @@
             </a:ln>
             <a:extLst>
               <a:ext uri="{91240B29-F687-4f45-9708-019B960494DF}">
-                <a14:hiddenLine xmlns="" xmlns:a14="http://schemas.microsoft.com/office/drawing/2010/main" w="9525">
+                <a14:hiddenLine xmlns:a14="http://schemas.microsoft.com/office/drawing/2010/main" xmlns="" w="9525">
                   <a:solidFill>
                     <a:srgbClr val="000000"/>
                   </a:solidFill>
@@ -442,7 +456,7 @@
             </a:ln>
             <a:extLst>
               <a:ext uri="{91240B29-F687-4f45-9708-019B960494DF}">
-                <a14:hiddenLine xmlns="" xmlns:a14="http://schemas.microsoft.com/office/drawing/2010/main" w="9525">
+                <a14:hiddenLine xmlns:a14="http://schemas.microsoft.com/office/drawing/2010/main" xmlns="" w="9525">
                   <a:solidFill>
                     <a:srgbClr val="000000"/>
                   </a:solidFill>
@@ -476,7 +490,7 @@
             </a:ln>
             <a:extLst>
               <a:ext uri="{91240B29-F687-4f45-9708-019B960494DF}">
-                <a14:hiddenLine xmlns="" xmlns:a14="http://schemas.microsoft.com/office/drawing/2010/main" w="9525">
+                <a14:hiddenLine xmlns:a14="http://schemas.microsoft.com/office/drawing/2010/main" xmlns="" w="9525">
                   <a:solidFill>
                     <a:srgbClr val="000000"/>
                   </a:solidFill>
@@ -566,7 +580,7 @@
             </a:ln>
             <a:extLst>
               <a:ext uri="{91240B29-F687-4f45-9708-019B960494DF}">
-                <a14:hiddenLine xmlns="" xmlns:a14="http://schemas.microsoft.com/office/drawing/2010/main" w="9525">
+                <a14:hiddenLine xmlns:a14="http://schemas.microsoft.com/office/drawing/2010/main" xmlns="" w="9525">
                   <a:solidFill>
                     <a:srgbClr val="000000"/>
                   </a:solidFill>
@@ -628,7 +642,7 @@
             </a:ln>
             <a:extLst>
               <a:ext uri="{91240B29-F687-4f45-9708-019B960494DF}">
-                <a14:hiddenLine xmlns="" xmlns:a14="http://schemas.microsoft.com/office/drawing/2010/main" w="9525">
+                <a14:hiddenLine xmlns:a14="http://schemas.microsoft.com/office/drawing/2010/main" xmlns="" w="9525">
                   <a:solidFill>
                     <a:srgbClr val="000000"/>
                   </a:solidFill>
@@ -690,7 +704,7 @@
             </a:ln>
             <a:extLst>
               <a:ext uri="{91240B29-F687-4f45-9708-019B960494DF}">
-                <a14:hiddenLine xmlns="" xmlns:a14="http://schemas.microsoft.com/office/drawing/2010/main" w="9525">
+                <a14:hiddenLine xmlns:a14="http://schemas.microsoft.com/office/drawing/2010/main" xmlns="" w="9525">
                   <a:solidFill>
                     <a:srgbClr val="000000"/>
                   </a:solidFill>
@@ -780,7 +794,7 @@
             </a:ln>
             <a:extLst>
               <a:ext uri="{91240B29-F687-4f45-9708-019B960494DF}">
-                <a14:hiddenLine xmlns="" xmlns:a14="http://schemas.microsoft.com/office/drawing/2010/main" w="9525">
+                <a14:hiddenLine xmlns:a14="http://schemas.microsoft.com/office/drawing/2010/main" xmlns="" w="9525">
                   <a:solidFill>
                     <a:srgbClr val="000000"/>
                   </a:solidFill>
@@ -842,7 +856,7 @@
             </a:ln>
             <a:extLst>
               <a:ext uri="{91240B29-F687-4f45-9708-019B960494DF}">
-                <a14:hiddenLine xmlns="" xmlns:a14="http://schemas.microsoft.com/office/drawing/2010/main" w="9525">
+                <a14:hiddenLine xmlns:a14="http://schemas.microsoft.com/office/drawing/2010/main" xmlns="" w="9525">
                   <a:solidFill>
                     <a:srgbClr val="000000"/>
                   </a:solidFill>
@@ -904,7 +918,7 @@
             </a:ln>
             <a:extLst>
               <a:ext uri="{91240B29-F687-4f45-9708-019B960494DF}">
-                <a14:hiddenLine xmlns="" xmlns:a14="http://schemas.microsoft.com/office/drawing/2010/main" w="9525">
+                <a14:hiddenLine xmlns:a14="http://schemas.microsoft.com/office/drawing/2010/main" xmlns="" w="9525">
                   <a:solidFill>
                     <a:srgbClr val="000000"/>
                   </a:solidFill>
@@ -994,7 +1008,7 @@
             </a:ln>
             <a:extLst>
               <a:ext uri="{91240B29-F687-4f45-9708-019B960494DF}">
-                <a14:hiddenLine xmlns="" xmlns:a14="http://schemas.microsoft.com/office/drawing/2010/main" w="9525">
+                <a14:hiddenLine xmlns:a14="http://schemas.microsoft.com/office/drawing/2010/main" xmlns="" w="9525">
                   <a:solidFill>
                     <a:srgbClr val="000000"/>
                   </a:solidFill>
@@ -1084,7 +1098,7 @@
             </a:ln>
             <a:extLst>
               <a:ext uri="{91240B29-F687-4f45-9708-019B960494DF}">
-                <a14:hiddenLine xmlns="" xmlns:a14="http://schemas.microsoft.com/office/drawing/2010/main" w="9525">
+                <a14:hiddenLine xmlns:a14="http://schemas.microsoft.com/office/drawing/2010/main" xmlns="" w="9525">
                   <a:solidFill>
                     <a:srgbClr val="000000"/>
                   </a:solidFill>
@@ -1146,7 +1160,7 @@
             </a:ln>
             <a:extLst>
               <a:ext uri="{91240B29-F687-4f45-9708-019B960494DF}">
-                <a14:hiddenLine xmlns="" xmlns:a14="http://schemas.microsoft.com/office/drawing/2010/main" w="9525">
+                <a14:hiddenLine xmlns:a14="http://schemas.microsoft.com/office/drawing/2010/main" xmlns="" w="9525">
                   <a:solidFill>
                     <a:srgbClr val="000000"/>
                   </a:solidFill>
@@ -1256,7 +1270,7 @@
             </a:ln>
             <a:extLst>
               <a:ext uri="{91240B29-F687-4f45-9708-019B960494DF}">
-                <a14:hiddenLine xmlns="" xmlns:a14="http://schemas.microsoft.com/office/drawing/2010/main" w="9525">
+                <a14:hiddenLine xmlns:a14="http://schemas.microsoft.com/office/drawing/2010/main" xmlns="" w="9525">
                   <a:solidFill>
                     <a:srgbClr val="000000"/>
                   </a:solidFill>
@@ -1318,7 +1332,7 @@
             </a:ln>
             <a:extLst>
               <a:ext uri="{91240B29-F687-4f45-9708-019B960494DF}">
-                <a14:hiddenLine xmlns="" xmlns:a14="http://schemas.microsoft.com/office/drawing/2010/main" w="9525">
+                <a14:hiddenLine xmlns:a14="http://schemas.microsoft.com/office/drawing/2010/main" xmlns="" w="9525">
                   <a:solidFill>
                     <a:srgbClr val="000000"/>
                   </a:solidFill>
@@ -1408,7 +1422,7 @@
             </a:ln>
             <a:extLst>
               <a:ext uri="{91240B29-F687-4f45-9708-019B960494DF}">
-                <a14:hiddenLine xmlns="" xmlns:a14="http://schemas.microsoft.com/office/drawing/2010/main" w="9525">
+                <a14:hiddenLine xmlns:a14="http://schemas.microsoft.com/office/drawing/2010/main" xmlns="" w="9525">
                   <a:solidFill>
                     <a:srgbClr val="000000"/>
                   </a:solidFill>
@@ -1498,7 +1512,7 @@
             </a:ln>
             <a:extLst>
               <a:ext uri="{91240B29-F687-4f45-9708-019B960494DF}">
-                <a14:hiddenLine xmlns="" xmlns:a14="http://schemas.microsoft.com/office/drawing/2010/main" w="9525">
+                <a14:hiddenLine xmlns:a14="http://schemas.microsoft.com/office/drawing/2010/main" xmlns="" w="9525">
                   <a:solidFill>
                     <a:srgbClr val="000000"/>
                   </a:solidFill>
@@ -1560,7 +1574,7 @@
             </a:ln>
             <a:extLst>
               <a:ext uri="{91240B29-F687-4f45-9708-019B960494DF}">
-                <a14:hiddenLine xmlns="" xmlns:a14="http://schemas.microsoft.com/office/drawing/2010/main" w="9525">
+                <a14:hiddenLine xmlns:a14="http://schemas.microsoft.com/office/drawing/2010/main" xmlns="" w="9525">
                   <a:solidFill>
                     <a:srgbClr val="000000"/>
                   </a:solidFill>
@@ -1650,7 +1664,7 @@
             </a:ln>
             <a:extLst>
               <a:ext uri="{91240B29-F687-4f45-9708-019B960494DF}">
-                <a14:hiddenLine xmlns="" xmlns:a14="http://schemas.microsoft.com/office/drawing/2010/main" w="9525">
+                <a14:hiddenLine xmlns:a14="http://schemas.microsoft.com/office/drawing/2010/main" xmlns="" w="9525">
                   <a:solidFill>
                     <a:srgbClr val="000000"/>
                   </a:solidFill>
@@ -1740,7 +1754,7 @@
             </a:ln>
             <a:extLst>
               <a:ext uri="{91240B29-F687-4f45-9708-019B960494DF}">
-                <a14:hiddenLine xmlns="" xmlns:a14="http://schemas.microsoft.com/office/drawing/2010/main" w="9525">
+                <a14:hiddenLine xmlns:a14="http://schemas.microsoft.com/office/drawing/2010/main" xmlns="" w="9525">
                   <a:solidFill>
                     <a:srgbClr val="000000"/>
                   </a:solidFill>
@@ -1796,7 +1810,7 @@
             </a:ln>
             <a:extLst>
               <a:ext uri="{91240B29-F687-4f45-9708-019B960494DF}">
-                <a14:hiddenLine xmlns="" xmlns:a14="http://schemas.microsoft.com/office/drawing/2010/main" w="9525">
+                <a14:hiddenLine xmlns:a14="http://schemas.microsoft.com/office/drawing/2010/main" xmlns="" w="9525">
                   <a:solidFill>
                     <a:srgbClr val="000000"/>
                   </a:solidFill>
@@ -1886,7 +1900,7 @@
             </a:ln>
             <a:extLst>
               <a:ext uri="{91240B29-F687-4f45-9708-019B960494DF}">
-                <a14:hiddenLine xmlns="" xmlns:a14="http://schemas.microsoft.com/office/drawing/2010/main" w="9525">
+                <a14:hiddenLine xmlns:a14="http://schemas.microsoft.com/office/drawing/2010/main" xmlns="" w="9525">
                   <a:solidFill>
                     <a:srgbClr val="000000"/>
                   </a:solidFill>
@@ -1942,7 +1956,7 @@
             </a:ln>
             <a:extLst>
               <a:ext uri="{91240B29-F687-4f45-9708-019B960494DF}">
-                <a14:hiddenLine xmlns="" xmlns:a14="http://schemas.microsoft.com/office/drawing/2010/main" w="9525">
+                <a14:hiddenLine xmlns:a14="http://schemas.microsoft.com/office/drawing/2010/main" xmlns="" w="9525">
                   <a:solidFill>
                     <a:srgbClr val="000000"/>
                   </a:solidFill>
@@ -2032,7 +2046,7 @@
             </a:ln>
             <a:extLst>
               <a:ext uri="{91240B29-F687-4f45-9708-019B960494DF}">
-                <a14:hiddenLine xmlns="" xmlns:a14="http://schemas.microsoft.com/office/drawing/2010/main" w="9525">
+                <a14:hiddenLine xmlns:a14="http://schemas.microsoft.com/office/drawing/2010/main" xmlns="" w="9525">
                   <a:solidFill>
                     <a:srgbClr val="000000"/>
                   </a:solidFill>
@@ -2100,7 +2114,7 @@
             </a:ln>
             <a:extLst>
               <a:ext uri="{91240B29-F687-4f45-9708-019B960494DF}">
-                <a14:hiddenLine xmlns="" xmlns:a14="http://schemas.microsoft.com/office/drawing/2010/main" w="9525">
+                <a14:hiddenLine xmlns:a14="http://schemas.microsoft.com/office/drawing/2010/main" xmlns="" w="9525">
                   <a:solidFill>
                     <a:srgbClr val="000000"/>
                   </a:solidFill>
@@ -2190,7 +2204,7 @@
             </a:ln>
             <a:extLst>
               <a:ext uri="{91240B29-F687-4f45-9708-019B960494DF}">
-                <a14:hiddenLine xmlns="" xmlns:a14="http://schemas.microsoft.com/office/drawing/2010/main" w="9525">
+                <a14:hiddenLine xmlns:a14="http://schemas.microsoft.com/office/drawing/2010/main" xmlns="" w="9525">
                   <a:solidFill>
                     <a:srgbClr val="000000"/>
                   </a:solidFill>
@@ -2258,7 +2272,7 @@
             </a:ln>
             <a:extLst>
               <a:ext uri="{91240B29-F687-4f45-9708-019B960494DF}">
-                <a14:hiddenLine xmlns="" xmlns:a14="http://schemas.microsoft.com/office/drawing/2010/main" w="9525">
+                <a14:hiddenLine xmlns:a14="http://schemas.microsoft.com/office/drawing/2010/main" xmlns="" w="9525">
                   <a:solidFill>
                     <a:srgbClr val="000000"/>
                   </a:solidFill>
@@ -2348,7 +2362,7 @@
             </a:ln>
             <a:extLst>
               <a:ext uri="{91240B29-F687-4f45-9708-019B960494DF}">
-                <a14:hiddenLine xmlns="" xmlns:a14="http://schemas.microsoft.com/office/drawing/2010/main" w="9525">
+                <a14:hiddenLine xmlns:a14="http://schemas.microsoft.com/office/drawing/2010/main" xmlns="" w="9525">
                   <a:solidFill>
                     <a:srgbClr val="000000"/>
                   </a:solidFill>
@@ -2382,7 +2396,7 @@
             </a:ln>
             <a:extLst>
               <a:ext uri="{91240B29-F687-4f45-9708-019B960494DF}">
-                <a14:hiddenLine xmlns="" xmlns:a14="http://schemas.microsoft.com/office/drawing/2010/main" w="9525">
+                <a14:hiddenLine xmlns:a14="http://schemas.microsoft.com/office/drawing/2010/main" xmlns="" w="9525">
                   <a:solidFill>
                     <a:srgbClr val="000000"/>
                   </a:solidFill>
@@ -2472,7 +2486,7 @@
             </a:ln>
             <a:extLst>
               <a:ext uri="{91240B29-F687-4f45-9708-019B960494DF}">
-                <a14:hiddenLine xmlns="" xmlns:a14="http://schemas.microsoft.com/office/drawing/2010/main" w="9525">
+                <a14:hiddenLine xmlns:a14="http://schemas.microsoft.com/office/drawing/2010/main" xmlns="" w="9525">
                   <a:solidFill>
                     <a:srgbClr val="000000"/>
                   </a:solidFill>
@@ -2534,7 +2548,7 @@
             </a:ln>
             <a:extLst>
               <a:ext uri="{91240B29-F687-4f45-9708-019B960494DF}">
-                <a14:hiddenLine xmlns="" xmlns:a14="http://schemas.microsoft.com/office/drawing/2010/main" w="9525">
+                <a14:hiddenLine xmlns:a14="http://schemas.microsoft.com/office/drawing/2010/main" xmlns="" w="9525">
                   <a:solidFill>
                     <a:srgbClr val="000000"/>
                   </a:solidFill>
@@ -2596,7 +2610,7 @@
             </a:ln>
             <a:extLst>
               <a:ext uri="{91240B29-F687-4f45-9708-019B960494DF}">
-                <a14:hiddenLine xmlns="" xmlns:a14="http://schemas.microsoft.com/office/drawing/2010/main" w="9525">
+                <a14:hiddenLine xmlns:a14="http://schemas.microsoft.com/office/drawing/2010/main" xmlns="" w="9525">
                   <a:solidFill>
                     <a:srgbClr val="000000"/>
                   </a:solidFill>
@@ -2686,7 +2700,7 @@
             </a:ln>
             <a:extLst>
               <a:ext uri="{91240B29-F687-4f45-9708-019B960494DF}">
-                <a14:hiddenLine xmlns="" xmlns:a14="http://schemas.microsoft.com/office/drawing/2010/main" w="9525">
+                <a14:hiddenLine xmlns:a14="http://schemas.microsoft.com/office/drawing/2010/main" xmlns="" w="9525">
                   <a:solidFill>
                     <a:srgbClr val="000000"/>
                   </a:solidFill>
@@ -2754,7 +2768,7 @@
             </a:ln>
             <a:extLst>
               <a:ext uri="{91240B29-F687-4f45-9708-019B960494DF}">
-                <a14:hiddenLine xmlns="" xmlns:a14="http://schemas.microsoft.com/office/drawing/2010/main" w="9525">
+                <a14:hiddenLine xmlns:a14="http://schemas.microsoft.com/office/drawing/2010/main" xmlns="" w="9525">
                   <a:solidFill>
                     <a:srgbClr val="000000"/>
                   </a:solidFill>
@@ -2816,7 +2830,7 @@
             </a:ln>
             <a:extLst>
               <a:ext uri="{91240B29-F687-4f45-9708-019B960494DF}">
-                <a14:hiddenLine xmlns="" xmlns:a14="http://schemas.microsoft.com/office/drawing/2010/main" w="9525">
+                <a14:hiddenLine xmlns:a14="http://schemas.microsoft.com/office/drawing/2010/main" xmlns="" w="9525">
                   <a:solidFill>
                     <a:srgbClr val="000000"/>
                   </a:solidFill>
@@ -2906,7 +2920,7 @@
             </a:ln>
             <a:extLst>
               <a:ext uri="{91240B29-F687-4f45-9708-019B960494DF}">
-                <a14:hiddenLine xmlns="" xmlns:a14="http://schemas.microsoft.com/office/drawing/2010/main" w="9525">
+                <a14:hiddenLine xmlns:a14="http://schemas.microsoft.com/office/drawing/2010/main" xmlns="" w="9525">
                   <a:solidFill>
                     <a:srgbClr val="000000"/>
                   </a:solidFill>
@@ -2968,7 +2982,7 @@
             </a:ln>
             <a:extLst>
               <a:ext uri="{91240B29-F687-4f45-9708-019B960494DF}">
-                <a14:hiddenLine xmlns="" xmlns:a14="http://schemas.microsoft.com/office/drawing/2010/main" w="9525">
+                <a14:hiddenLine xmlns:a14="http://schemas.microsoft.com/office/drawing/2010/main" xmlns="" w="9525">
                   <a:solidFill>
                     <a:srgbClr val="000000"/>
                   </a:solidFill>
@@ -3058,7 +3072,7 @@
             </a:ln>
             <a:extLst>
               <a:ext uri="{91240B29-F687-4f45-9708-019B960494DF}">
-                <a14:hiddenLine xmlns="" xmlns:a14="http://schemas.microsoft.com/office/drawing/2010/main" w="9525">
+                <a14:hiddenLine xmlns:a14="http://schemas.microsoft.com/office/drawing/2010/main" xmlns="" w="9525">
                   <a:solidFill>
                     <a:srgbClr val="000000"/>
                   </a:solidFill>
@@ -3120,7 +3134,7 @@
             </a:ln>
             <a:extLst>
               <a:ext uri="{91240B29-F687-4f45-9708-019B960494DF}">
-                <a14:hiddenLine xmlns="" xmlns:a14="http://schemas.microsoft.com/office/drawing/2010/main" w="9525">
+                <a14:hiddenLine xmlns:a14="http://schemas.microsoft.com/office/drawing/2010/main" xmlns="" w="9525">
                   <a:solidFill>
                     <a:srgbClr val="000000"/>
                   </a:solidFill>
@@ -3210,7 +3224,7 @@
             </a:ln>
             <a:extLst>
               <a:ext uri="{91240B29-F687-4f45-9708-019B960494DF}">
-                <a14:hiddenLine xmlns="" xmlns:a14="http://schemas.microsoft.com/office/drawing/2010/main" w="9525">
+                <a14:hiddenLine xmlns:a14="http://schemas.microsoft.com/office/drawing/2010/main" xmlns="" w="9525">
                   <a:solidFill>
                     <a:srgbClr val="000000"/>
                   </a:solidFill>
@@ -3244,7 +3258,7 @@
             </a:ln>
             <a:extLst>
               <a:ext uri="{91240B29-F687-4f45-9708-019B960494DF}">
-                <a14:hiddenLine xmlns="" xmlns:a14="http://schemas.microsoft.com/office/drawing/2010/main" w="9525">
+                <a14:hiddenLine xmlns:a14="http://schemas.microsoft.com/office/drawing/2010/main" xmlns="" w="9525">
                   <a:solidFill>
                     <a:srgbClr val="000000"/>
                   </a:solidFill>
@@ -3309,7 +3323,7 @@
             </a:ln>
             <a:extLst>
               <a:ext uri="{91240B29-F687-4f45-9708-019B960494DF}">
-                <a14:hiddenLine xmlns="" xmlns:a14="http://schemas.microsoft.com/office/drawing/2010/main" w="9525">
+                <a14:hiddenLine xmlns:a14="http://schemas.microsoft.com/office/drawing/2010/main" xmlns="" w="9525">
                   <a:solidFill>
                     <a:srgbClr val="000000"/>
                   </a:solidFill>
@@ -3399,7 +3413,7 @@
             </a:ln>
             <a:extLst>
               <a:ext uri="{91240B29-F687-4f45-9708-019B960494DF}">
-                <a14:hiddenLine xmlns="" xmlns:a14="http://schemas.microsoft.com/office/drawing/2010/main" w="9525">
+                <a14:hiddenLine xmlns:a14="http://schemas.microsoft.com/office/drawing/2010/main" xmlns="" w="9525">
                   <a:solidFill>
                     <a:srgbClr val="000000"/>
                   </a:solidFill>
@@ -3461,7 +3475,7 @@
             </a:ln>
             <a:extLst>
               <a:ext uri="{91240B29-F687-4f45-9708-019B960494DF}">
-                <a14:hiddenLine xmlns="" xmlns:a14="http://schemas.microsoft.com/office/drawing/2010/main" w="9525">
+                <a14:hiddenLine xmlns:a14="http://schemas.microsoft.com/office/drawing/2010/main" xmlns="" w="9525">
                   <a:solidFill>
                     <a:srgbClr val="000000"/>
                   </a:solidFill>
@@ -3551,7 +3565,7 @@
             </a:ln>
             <a:extLst>
               <a:ext uri="{91240B29-F687-4f45-9708-019B960494DF}">
-                <a14:hiddenLine xmlns="" xmlns:a14="http://schemas.microsoft.com/office/drawing/2010/main" w="9525">
+                <a14:hiddenLine xmlns:a14="http://schemas.microsoft.com/office/drawing/2010/main" xmlns="" w="9525">
                   <a:solidFill>
                     <a:srgbClr val="000000"/>
                   </a:solidFill>
@@ -3641,7 +3655,7 @@
             </a:ln>
             <a:extLst>
               <a:ext uri="{91240B29-F687-4f45-9708-019B960494DF}">
-                <a14:hiddenLine xmlns="" xmlns:a14="http://schemas.microsoft.com/office/drawing/2010/main" w="9525">
+                <a14:hiddenLine xmlns:a14="http://schemas.microsoft.com/office/drawing/2010/main" xmlns="" w="9525">
                   <a:solidFill>
                     <a:srgbClr val="000000"/>
                   </a:solidFill>
@@ -3706,7 +3720,7 @@
             </a:ln>
             <a:extLst>
               <a:ext uri="{91240B29-F687-4f45-9708-019B960494DF}">
-                <a14:hiddenLine xmlns="" xmlns:a14="http://schemas.microsoft.com/office/drawing/2010/main" w="9525">
+                <a14:hiddenLine xmlns:a14="http://schemas.microsoft.com/office/drawing/2010/main" xmlns="" w="9525">
                   <a:solidFill>
                     <a:srgbClr val="000000"/>
                   </a:solidFill>
@@ -3768,7 +3782,7 @@
             </a:ln>
             <a:extLst>
               <a:ext uri="{91240B29-F687-4f45-9708-019B960494DF}">
-                <a14:hiddenLine xmlns="" xmlns:a14="http://schemas.microsoft.com/office/drawing/2010/main" w="9525">
+                <a14:hiddenLine xmlns:a14="http://schemas.microsoft.com/office/drawing/2010/main" xmlns="" w="9525">
                   <a:solidFill>
                     <a:srgbClr val="000000"/>
                   </a:solidFill>
@@ -3858,7 +3872,7 @@
             </a:ln>
             <a:extLst>
               <a:ext uri="{91240B29-F687-4f45-9708-019B960494DF}">
-                <a14:hiddenLine xmlns="" xmlns:a14="http://schemas.microsoft.com/office/drawing/2010/main" w="9525">
+                <a14:hiddenLine xmlns:a14="http://schemas.microsoft.com/office/drawing/2010/main" xmlns="" w="9525">
                   <a:solidFill>
                     <a:srgbClr val="000000"/>
                   </a:solidFill>
@@ -3948,7 +3962,7 @@
             </a:ln>
             <a:extLst>
               <a:ext uri="{91240B29-F687-4f45-9708-019B960494DF}">
-                <a14:hiddenLine xmlns="" xmlns:a14="http://schemas.microsoft.com/office/drawing/2010/main" w="9525">
+                <a14:hiddenLine xmlns:a14="http://schemas.microsoft.com/office/drawing/2010/main" xmlns="" w="9525">
                   <a:solidFill>
                     <a:srgbClr val="000000"/>
                   </a:solidFill>
@@ -4010,7 +4024,7 @@
             </a:ln>
             <a:extLst>
               <a:ext uri="{91240B29-F687-4f45-9708-019B960494DF}">
-                <a14:hiddenLine xmlns="" xmlns:a14="http://schemas.microsoft.com/office/drawing/2010/main" w="9525">
+                <a14:hiddenLine xmlns:a14="http://schemas.microsoft.com/office/drawing/2010/main" xmlns="" w="9525">
                   <a:solidFill>
                     <a:srgbClr val="000000"/>
                   </a:solidFill>
@@ -4130,7 +4144,7 @@
             </a:ln>
             <a:extLst>
               <a:ext uri="{91240B29-F687-4f45-9708-019B960494DF}">
-                <a14:hiddenLine xmlns="" xmlns:a14="http://schemas.microsoft.com/office/drawing/2010/main" w="9525">
+                <a14:hiddenLine xmlns:a14="http://schemas.microsoft.com/office/drawing/2010/main" xmlns="" w="9525">
                   <a:solidFill>
                     <a:srgbClr val="000000"/>
                   </a:solidFill>
@@ -4198,7 +4212,7 @@
             </a:ln>
             <a:extLst>
               <a:ext uri="{91240B29-F687-4f45-9708-019B960494DF}">
-                <a14:hiddenLine xmlns="" xmlns:a14="http://schemas.microsoft.com/office/drawing/2010/main" w="9525">
+                <a14:hiddenLine xmlns:a14="http://schemas.microsoft.com/office/drawing/2010/main" xmlns="" w="9525">
                   <a:solidFill>
                     <a:srgbClr val="000000"/>
                   </a:solidFill>
@@ -4288,7 +4302,7 @@
             </a:ln>
             <a:extLst>
               <a:ext uri="{91240B29-F687-4f45-9708-019B960494DF}">
-                <a14:hiddenLine xmlns="" xmlns:a14="http://schemas.microsoft.com/office/drawing/2010/main" w="9525">
+                <a14:hiddenLine xmlns:a14="http://schemas.microsoft.com/office/drawing/2010/main" xmlns="" w="9525">
                   <a:solidFill>
                     <a:srgbClr val="000000"/>
                   </a:solidFill>
@@ -4428,7 +4442,7 @@
           <a:p>
             <a:fld id="{48A87A34-81AB-432B-8DAE-1953F412C126}" type="datetimeFigureOut">
               <a:rPr lang="en-US" dirty="0"/>
-              <a:t>11/7/2023</a:t>
+              <a:t>11/9/2023</a:t>
             </a:fld>
             <a:endParaRPr lang="en-US" dirty="0"/>
           </a:p>
@@ -4690,7 +4704,7 @@
           <a:p>
             <a:fld id="{48A87A34-81AB-432B-8DAE-1953F412C126}" type="datetimeFigureOut">
               <a:rPr lang="en-US" dirty="0"/>
-              <a:t>11/7/2023</a:t>
+              <a:t>11/9/2023</a:t>
             </a:fld>
             <a:endParaRPr lang="en-US" dirty="0"/>
           </a:p>
@@ -4881,7 +4895,7 @@
           <a:p>
             <a:fld id="{48A87A34-81AB-432B-8DAE-1953F412C126}" type="datetimeFigureOut">
               <a:rPr lang="en-US" dirty="0"/>
-              <a:t>11/7/2023</a:t>
+              <a:t>11/9/2023</a:t>
             </a:fld>
             <a:endParaRPr lang="en-US" dirty="0"/>
           </a:p>
@@ -5139,7 +5153,7 @@
           <a:p>
             <a:fld id="{48A87A34-81AB-432B-8DAE-1953F412C126}" type="datetimeFigureOut">
               <a:rPr lang="en-US" dirty="0"/>
-              <a:t>11/7/2023</a:t>
+              <a:t>11/9/2023</a:t>
             </a:fld>
             <a:endParaRPr lang="en-US" dirty="0"/>
           </a:p>
@@ -5568,7 +5582,7 @@
           <a:p>
             <a:fld id="{48A87A34-81AB-432B-8DAE-1953F412C126}" type="datetimeFigureOut">
               <a:rPr lang="en-US" dirty="0"/>
-              <a:t>11/7/2023</a:t>
+              <a:t>11/9/2023</a:t>
             </a:fld>
             <a:endParaRPr lang="en-US" dirty="0"/>
           </a:p>
@@ -6109,7 +6123,7 @@
           <a:p>
             <a:fld id="{48A87A34-81AB-432B-8DAE-1953F412C126}" type="datetimeFigureOut">
               <a:rPr lang="en-US" dirty="0"/>
-              <a:t>11/7/2023</a:t>
+              <a:t>11/9/2023</a:t>
             </a:fld>
             <a:endParaRPr lang="en-US" dirty="0"/>
           </a:p>
@@ -6824,7 +6838,7 @@
           <a:p>
             <a:fld id="{48A87A34-81AB-432B-8DAE-1953F412C126}" type="datetimeFigureOut">
               <a:rPr lang="en-US" dirty="0"/>
-              <a:t>11/7/2023</a:t>
+              <a:t>11/9/2023</a:t>
             </a:fld>
             <a:endParaRPr lang="en-US" dirty="0"/>
           </a:p>
@@ -6989,7 +7003,7 @@
           <a:p>
             <a:fld id="{48A87A34-81AB-432B-8DAE-1953F412C126}" type="datetimeFigureOut">
               <a:rPr lang="en-US" dirty="0"/>
-              <a:t>11/7/2023</a:t>
+              <a:t>11/9/2023</a:t>
             </a:fld>
             <a:endParaRPr lang="en-US" dirty="0"/>
           </a:p>
@@ -7164,7 +7178,7 @@
           <a:p>
             <a:fld id="{48A87A34-81AB-432B-8DAE-1953F412C126}" type="datetimeFigureOut">
               <a:rPr lang="en-US" dirty="0"/>
-              <a:t>11/7/2023</a:t>
+              <a:t>11/9/2023</a:t>
             </a:fld>
             <a:endParaRPr lang="en-US" dirty="0"/>
           </a:p>
@@ -7329,7 +7343,7 @@
           <a:p>
             <a:fld id="{48A87A34-81AB-432B-8DAE-1953F412C126}" type="datetimeFigureOut">
               <a:rPr lang="en-US" dirty="0"/>
-              <a:t>11/7/2023</a:t>
+              <a:t>11/9/2023</a:t>
             </a:fld>
             <a:endParaRPr lang="en-US" dirty="0"/>
           </a:p>
@@ -7574,7 +7588,7 @@
           <a:p>
             <a:fld id="{48A87A34-81AB-432B-8DAE-1953F412C126}" type="datetimeFigureOut">
               <a:rPr lang="en-US" dirty="0"/>
-              <a:t>11/7/2023</a:t>
+              <a:t>11/9/2023</a:t>
             </a:fld>
             <a:endParaRPr lang="en-US" dirty="0"/>
           </a:p>
@@ -7801,7 +7815,7 @@
           <a:p>
             <a:fld id="{48A87A34-81AB-432B-8DAE-1953F412C126}" type="datetimeFigureOut">
               <a:rPr lang="en-US" dirty="0"/>
-              <a:t>11/7/2023</a:t>
+              <a:t>11/9/2023</a:t>
             </a:fld>
             <a:endParaRPr lang="en-US" dirty="0"/>
           </a:p>
@@ -8177,7 +8191,7 @@
           <a:p>
             <a:fld id="{48A87A34-81AB-432B-8DAE-1953F412C126}" type="datetimeFigureOut">
               <a:rPr lang="en-US" dirty="0"/>
-              <a:t>11/7/2023</a:t>
+              <a:t>11/9/2023</a:t>
             </a:fld>
             <a:endParaRPr lang="en-US" dirty="0"/>
           </a:p>
@@ -8290,7 +8304,7 @@
           <a:p>
             <a:fld id="{48A87A34-81AB-432B-8DAE-1953F412C126}" type="datetimeFigureOut">
               <a:rPr lang="en-US" dirty="0"/>
-              <a:t>11/7/2023</a:t>
+              <a:t>11/9/2023</a:t>
             </a:fld>
             <a:endParaRPr lang="en-US" dirty="0"/>
           </a:p>
@@ -8380,7 +8394,7 @@
           <a:p>
             <a:fld id="{48A87A34-81AB-432B-8DAE-1953F412C126}" type="datetimeFigureOut">
               <a:rPr lang="en-US" dirty="0"/>
-              <a:t>11/7/2023</a:t>
+              <a:t>11/9/2023</a:t>
             </a:fld>
             <a:endParaRPr lang="en-US" dirty="0"/>
           </a:p>
@@ -8624,7 +8638,7 @@
           <a:p>
             <a:fld id="{48A87A34-81AB-432B-8DAE-1953F412C126}" type="datetimeFigureOut">
               <a:rPr lang="en-US" dirty="0"/>
-              <a:t>11/7/2023</a:t>
+              <a:t>11/9/2023</a:t>
             </a:fld>
             <a:endParaRPr lang="en-US" dirty="0"/>
           </a:p>
@@ -8899,7 +8913,7 @@
           <a:p>
             <a:fld id="{48A87A34-81AB-432B-8DAE-1953F412C126}" type="datetimeFigureOut">
               <a:rPr lang="en-US" dirty="0"/>
-              <a:t>11/7/2023</a:t>
+              <a:t>11/9/2023</a:t>
             </a:fld>
             <a:endParaRPr lang="en-US" dirty="0"/>
           </a:p>
@@ -9017,7 +9031,7 @@
           <a:noFill/>
           <a:extLst>
             <a:ext uri="{909E8E84-426E-40dd-AFC4-6F175D3DCCD1}">
-              <a14:hiddenFill xmlns="" xmlns:a14="http://schemas.microsoft.com/office/drawing/2010/main">
+              <a14:hiddenFill xmlns:a14="http://schemas.microsoft.com/office/drawing/2010/main" xmlns="">
                 <a:solidFill>
                   <a:srgbClr val="FFFFFF"/>
                 </a:solidFill>
@@ -9091,7 +9105,7 @@
               </a:ln>
               <a:extLst>
                 <a:ext uri="{91240B29-F687-4f45-9708-019B960494DF}">
-                  <a14:hiddenLine xmlns="" xmlns:a14="http://schemas.microsoft.com/office/drawing/2010/main" w="9525">
+                  <a14:hiddenLine xmlns:a14="http://schemas.microsoft.com/office/drawing/2010/main" xmlns="" w="9525">
                     <a:solidFill>
                       <a:srgbClr val="000000"/>
                     </a:solidFill>
@@ -9181,7 +9195,7 @@
               </a:ln>
               <a:extLst>
                 <a:ext uri="{91240B29-F687-4f45-9708-019B960494DF}">
-                  <a14:hiddenLine xmlns="" xmlns:a14="http://schemas.microsoft.com/office/drawing/2010/main" w="9525">
+                  <a14:hiddenLine xmlns:a14="http://schemas.microsoft.com/office/drawing/2010/main" xmlns="" w="9525">
                     <a:solidFill>
                       <a:srgbClr val="000000"/>
                     </a:solidFill>
@@ -9271,7 +9285,7 @@
               </a:ln>
               <a:extLst>
                 <a:ext uri="{91240B29-F687-4f45-9708-019B960494DF}">
-                  <a14:hiddenLine xmlns="" xmlns:a14="http://schemas.microsoft.com/office/drawing/2010/main" w="9525">
+                  <a14:hiddenLine xmlns:a14="http://schemas.microsoft.com/office/drawing/2010/main" xmlns="" w="9525">
                     <a:solidFill>
                       <a:srgbClr val="000000"/>
                     </a:solidFill>
@@ -9333,7 +9347,7 @@
               </a:ln>
               <a:extLst>
                 <a:ext uri="{91240B29-F687-4f45-9708-019B960494DF}">
-                  <a14:hiddenLine xmlns="" xmlns:a14="http://schemas.microsoft.com/office/drawing/2010/main" w="9525">
+                  <a14:hiddenLine xmlns:a14="http://schemas.microsoft.com/office/drawing/2010/main" xmlns="" w="9525">
                     <a:solidFill>
                       <a:srgbClr val="000000"/>
                     </a:solidFill>
@@ -9423,7 +9437,7 @@
               </a:ln>
               <a:extLst>
                 <a:ext uri="{91240B29-F687-4f45-9708-019B960494DF}">
-                  <a14:hiddenLine xmlns="" xmlns:a14="http://schemas.microsoft.com/office/drawing/2010/main" w="9525">
+                  <a14:hiddenLine xmlns:a14="http://schemas.microsoft.com/office/drawing/2010/main" xmlns="" w="9525">
                     <a:solidFill>
                       <a:srgbClr val="000000"/>
                     </a:solidFill>
@@ -9485,7 +9499,7 @@
               </a:ln>
               <a:extLst>
                 <a:ext uri="{91240B29-F687-4f45-9708-019B960494DF}">
-                  <a14:hiddenLine xmlns="" xmlns:a14="http://schemas.microsoft.com/office/drawing/2010/main" w="9525">
+                  <a14:hiddenLine xmlns:a14="http://schemas.microsoft.com/office/drawing/2010/main" xmlns="" w="9525">
                     <a:solidFill>
                       <a:srgbClr val="000000"/>
                     </a:solidFill>
@@ -9547,7 +9561,7 @@
               </a:ln>
               <a:extLst>
                 <a:ext uri="{91240B29-F687-4f45-9708-019B960494DF}">
-                  <a14:hiddenLine xmlns="" xmlns:a14="http://schemas.microsoft.com/office/drawing/2010/main" w="9525">
+                  <a14:hiddenLine xmlns:a14="http://schemas.microsoft.com/office/drawing/2010/main" xmlns="" w="9525">
                     <a:solidFill>
                       <a:srgbClr val="000000"/>
                     </a:solidFill>
@@ -9637,7 +9651,7 @@
               </a:ln>
               <a:extLst>
                 <a:ext uri="{91240B29-F687-4f45-9708-019B960494DF}">
-                  <a14:hiddenLine xmlns="" xmlns:a14="http://schemas.microsoft.com/office/drawing/2010/main" w="9525">
+                  <a14:hiddenLine xmlns:a14="http://schemas.microsoft.com/office/drawing/2010/main" xmlns="" w="9525">
                     <a:solidFill>
                       <a:srgbClr val="000000"/>
                     </a:solidFill>
@@ -9727,7 +9741,7 @@
               </a:ln>
               <a:extLst>
                 <a:ext uri="{91240B29-F687-4f45-9708-019B960494DF}">
-                  <a14:hiddenLine xmlns="" xmlns:a14="http://schemas.microsoft.com/office/drawing/2010/main" w="9525">
+                  <a14:hiddenLine xmlns:a14="http://schemas.microsoft.com/office/drawing/2010/main" xmlns="" w="9525">
                     <a:solidFill>
                       <a:srgbClr val="000000"/>
                     </a:solidFill>
@@ -9789,7 +9803,7 @@
               </a:ln>
               <a:extLst>
                 <a:ext uri="{91240B29-F687-4f45-9708-019B960494DF}">
-                  <a14:hiddenLine xmlns="" xmlns:a14="http://schemas.microsoft.com/office/drawing/2010/main" w="9525">
+                  <a14:hiddenLine xmlns:a14="http://schemas.microsoft.com/office/drawing/2010/main" xmlns="" w="9525">
                     <a:solidFill>
                       <a:srgbClr val="000000"/>
                     </a:solidFill>
@@ -9899,7 +9913,7 @@
               </a:ln>
               <a:extLst>
                 <a:ext uri="{91240B29-F687-4f45-9708-019B960494DF}">
-                  <a14:hiddenLine xmlns="" xmlns:a14="http://schemas.microsoft.com/office/drawing/2010/main" w="9525">
+                  <a14:hiddenLine xmlns:a14="http://schemas.microsoft.com/office/drawing/2010/main" xmlns="" w="9525">
                     <a:solidFill>
                       <a:srgbClr val="000000"/>
                     </a:solidFill>
@@ -9983,7 +9997,7 @@
               </a:ln>
               <a:extLst>
                 <a:ext uri="{91240B29-F687-4f45-9708-019B960494DF}">
-                  <a14:hiddenLine xmlns="" xmlns:a14="http://schemas.microsoft.com/office/drawing/2010/main" w="9525">
+                  <a14:hiddenLine xmlns:a14="http://schemas.microsoft.com/office/drawing/2010/main" xmlns="" w="9525">
                     <a:solidFill>
                       <a:srgbClr val="000000"/>
                     </a:solidFill>
@@ -10045,7 +10059,7 @@
               </a:ln>
               <a:extLst>
                 <a:ext uri="{91240B29-F687-4f45-9708-019B960494DF}">
-                  <a14:hiddenLine xmlns="" xmlns:a14="http://schemas.microsoft.com/office/drawing/2010/main" w="9525">
+                  <a14:hiddenLine xmlns:a14="http://schemas.microsoft.com/office/drawing/2010/main" xmlns="" w="9525">
                     <a:solidFill>
                       <a:srgbClr val="000000"/>
                     </a:solidFill>
@@ -10107,7 +10121,7 @@
               </a:ln>
               <a:extLst>
                 <a:ext uri="{91240B29-F687-4f45-9708-019B960494DF}">
-                  <a14:hiddenLine xmlns="" xmlns:a14="http://schemas.microsoft.com/office/drawing/2010/main" w="9525">
+                  <a14:hiddenLine xmlns:a14="http://schemas.microsoft.com/office/drawing/2010/main" xmlns="" w="9525">
                     <a:solidFill>
                       <a:srgbClr val="000000"/>
                     </a:solidFill>
@@ -10197,7 +10211,7 @@
               </a:ln>
               <a:extLst>
                 <a:ext uri="{91240B29-F687-4f45-9708-019B960494DF}">
-                  <a14:hiddenLine xmlns="" xmlns:a14="http://schemas.microsoft.com/office/drawing/2010/main" w="9525">
+                  <a14:hiddenLine xmlns:a14="http://schemas.microsoft.com/office/drawing/2010/main" xmlns="" w="9525">
                     <a:solidFill>
                       <a:srgbClr val="000000"/>
                     </a:solidFill>
@@ -10231,7 +10245,7 @@
               </a:ln>
               <a:extLst>
                 <a:ext uri="{91240B29-F687-4f45-9708-019B960494DF}">
-                  <a14:hiddenLine xmlns="" xmlns:a14="http://schemas.microsoft.com/office/drawing/2010/main" w="9525">
+                  <a14:hiddenLine xmlns:a14="http://schemas.microsoft.com/office/drawing/2010/main" xmlns="" w="9525">
                     <a:solidFill>
                       <a:srgbClr val="000000"/>
                     </a:solidFill>
@@ -10296,7 +10310,7 @@
               </a:ln>
               <a:extLst>
                 <a:ext uri="{91240B29-F687-4f45-9708-019B960494DF}">
-                  <a14:hiddenLine xmlns="" xmlns:a14="http://schemas.microsoft.com/office/drawing/2010/main" w="9525">
+                  <a14:hiddenLine xmlns:a14="http://schemas.microsoft.com/office/drawing/2010/main" xmlns="" w="9525">
                     <a:solidFill>
                       <a:srgbClr val="000000"/>
                     </a:solidFill>
@@ -10386,7 +10400,7 @@
               </a:ln>
               <a:extLst>
                 <a:ext uri="{91240B29-F687-4f45-9708-019B960494DF}">
-                  <a14:hiddenLine xmlns="" xmlns:a14="http://schemas.microsoft.com/office/drawing/2010/main" w="9525">
+                  <a14:hiddenLine xmlns:a14="http://schemas.microsoft.com/office/drawing/2010/main" xmlns="" w="9525">
                     <a:solidFill>
                       <a:srgbClr val="000000"/>
                     </a:solidFill>
@@ -10448,7 +10462,7 @@
               </a:ln>
               <a:extLst>
                 <a:ext uri="{91240B29-F687-4f45-9708-019B960494DF}">
-                  <a14:hiddenLine xmlns="" xmlns:a14="http://schemas.microsoft.com/office/drawing/2010/main" w="9525">
+                  <a14:hiddenLine xmlns:a14="http://schemas.microsoft.com/office/drawing/2010/main" xmlns="" w="9525">
                     <a:solidFill>
                       <a:srgbClr val="000000"/>
                     </a:solidFill>
@@ -10538,7 +10552,7 @@
               </a:ln>
               <a:extLst>
                 <a:ext uri="{91240B29-F687-4f45-9708-019B960494DF}">
-                  <a14:hiddenLine xmlns="" xmlns:a14="http://schemas.microsoft.com/office/drawing/2010/main" w="9525">
+                  <a14:hiddenLine xmlns:a14="http://schemas.microsoft.com/office/drawing/2010/main" xmlns="" w="9525">
                     <a:solidFill>
                       <a:srgbClr val="000000"/>
                     </a:solidFill>
@@ -10603,7 +10617,7 @@
               </a:ln>
               <a:extLst>
                 <a:ext uri="{91240B29-F687-4f45-9708-019B960494DF}">
-                  <a14:hiddenLine xmlns="" xmlns:a14="http://schemas.microsoft.com/office/drawing/2010/main" w="9525">
+                  <a14:hiddenLine xmlns:a14="http://schemas.microsoft.com/office/drawing/2010/main" xmlns="" w="9525">
                     <a:solidFill>
                       <a:srgbClr val="000000"/>
                     </a:solidFill>
@@ -10665,7 +10679,7 @@
               </a:ln>
               <a:extLst>
                 <a:ext uri="{91240B29-F687-4f45-9708-019B960494DF}">
-                  <a14:hiddenLine xmlns="" xmlns:a14="http://schemas.microsoft.com/office/drawing/2010/main" w="9525">
+                  <a14:hiddenLine xmlns:a14="http://schemas.microsoft.com/office/drawing/2010/main" xmlns="" w="9525">
                     <a:solidFill>
                       <a:srgbClr val="000000"/>
                     </a:solidFill>
@@ -10755,7 +10769,7 @@
               </a:ln>
               <a:extLst>
                 <a:ext uri="{91240B29-F687-4f45-9708-019B960494DF}">
-                  <a14:hiddenLine xmlns="" xmlns:a14="http://schemas.microsoft.com/office/drawing/2010/main" w="9525">
+                  <a14:hiddenLine xmlns:a14="http://schemas.microsoft.com/office/drawing/2010/main" xmlns="" w="9525">
                     <a:solidFill>
                       <a:srgbClr val="000000"/>
                     </a:solidFill>
@@ -10845,7 +10859,7 @@
               </a:ln>
               <a:extLst>
                 <a:ext uri="{91240B29-F687-4f45-9708-019B960494DF}">
-                  <a14:hiddenLine xmlns="" xmlns:a14="http://schemas.microsoft.com/office/drawing/2010/main" w="9525">
+                  <a14:hiddenLine xmlns:a14="http://schemas.microsoft.com/office/drawing/2010/main" xmlns="" w="9525">
                     <a:solidFill>
                       <a:srgbClr val="000000"/>
                     </a:solidFill>
@@ -10910,7 +10924,7 @@
               </a:ln>
               <a:extLst>
                 <a:ext uri="{91240B29-F687-4f45-9708-019B960494DF}">
-                  <a14:hiddenLine xmlns="" xmlns:a14="http://schemas.microsoft.com/office/drawing/2010/main" w="9525">
+                  <a14:hiddenLine xmlns:a14="http://schemas.microsoft.com/office/drawing/2010/main" xmlns="" w="9525">
                     <a:solidFill>
                       <a:srgbClr val="000000"/>
                     </a:solidFill>
@@ -11030,7 +11044,7 @@
               </a:ln>
               <a:extLst>
                 <a:ext uri="{91240B29-F687-4f45-9708-019B960494DF}">
-                  <a14:hiddenLine xmlns="" xmlns:a14="http://schemas.microsoft.com/office/drawing/2010/main" w="9525">
+                  <a14:hiddenLine xmlns:a14="http://schemas.microsoft.com/office/drawing/2010/main" xmlns="" w="9525">
                     <a:solidFill>
                       <a:srgbClr val="000000"/>
                     </a:solidFill>
@@ -11128,7 +11142,7 @@
               </a:ln>
               <a:extLst>
                 <a:ext uri="{91240B29-F687-4f45-9708-019B960494DF}">
-                  <a14:hiddenLine xmlns="" xmlns:a14="http://schemas.microsoft.com/office/drawing/2010/main" w="9525">
+                  <a14:hiddenLine xmlns:a14="http://schemas.microsoft.com/office/drawing/2010/main" xmlns="" w="9525">
                     <a:solidFill>
                       <a:srgbClr val="000000"/>
                     </a:solidFill>
@@ -11243,7 +11257,7 @@
               </a:ln>
               <a:extLst>
                 <a:ext uri="{91240B29-F687-4f45-9708-019B960494DF}">
-                  <a14:hiddenLine xmlns="" xmlns:a14="http://schemas.microsoft.com/office/drawing/2010/main" w="9525">
+                  <a14:hiddenLine xmlns:a14="http://schemas.microsoft.com/office/drawing/2010/main" xmlns="" w="9525">
                     <a:solidFill>
                       <a:srgbClr val="000000"/>
                     </a:solidFill>
@@ -11333,7 +11347,7 @@
               </a:ln>
               <a:extLst>
                 <a:ext uri="{91240B29-F687-4f45-9708-019B960494DF}">
-                  <a14:hiddenLine xmlns="" xmlns:a14="http://schemas.microsoft.com/office/drawing/2010/main" w="9525">
+                  <a14:hiddenLine xmlns:a14="http://schemas.microsoft.com/office/drawing/2010/main" xmlns="" w="9525">
                     <a:solidFill>
                       <a:srgbClr val="000000"/>
                     </a:solidFill>
@@ -11398,7 +11412,7 @@
               </a:ln>
               <a:extLst>
                 <a:ext uri="{91240B29-F687-4f45-9708-019B960494DF}">
-                  <a14:hiddenLine xmlns="" xmlns:a14="http://schemas.microsoft.com/office/drawing/2010/main" w="9525">
+                  <a14:hiddenLine xmlns:a14="http://schemas.microsoft.com/office/drawing/2010/main" xmlns="" w="9525">
                     <a:solidFill>
                       <a:srgbClr val="000000"/>
                     </a:solidFill>
@@ -11488,7 +11502,7 @@
               </a:ln>
               <a:extLst>
                 <a:ext uri="{91240B29-F687-4f45-9708-019B960494DF}">
-                  <a14:hiddenLine xmlns="" xmlns:a14="http://schemas.microsoft.com/office/drawing/2010/main" w="9525">
+                  <a14:hiddenLine xmlns:a14="http://schemas.microsoft.com/office/drawing/2010/main" xmlns="" w="9525">
                     <a:solidFill>
                       <a:srgbClr val="000000"/>
                     </a:solidFill>
@@ -11556,7 +11570,7 @@
               </a:ln>
               <a:extLst>
                 <a:ext uri="{91240B29-F687-4f45-9708-019B960494DF}">
-                  <a14:hiddenLine xmlns="" xmlns:a14="http://schemas.microsoft.com/office/drawing/2010/main" w="9525">
+                  <a14:hiddenLine xmlns:a14="http://schemas.microsoft.com/office/drawing/2010/main" xmlns="" w="9525">
                     <a:solidFill>
                       <a:srgbClr val="000000"/>
                     </a:solidFill>
@@ -11646,7 +11660,7 @@
               </a:ln>
               <a:extLst>
                 <a:ext uri="{91240B29-F687-4f45-9708-019B960494DF}">
-                  <a14:hiddenLine xmlns="" xmlns:a14="http://schemas.microsoft.com/office/drawing/2010/main" w="9525">
+                  <a14:hiddenLine xmlns:a14="http://schemas.microsoft.com/office/drawing/2010/main" xmlns="" w="9525">
                     <a:solidFill>
                       <a:srgbClr val="000000"/>
                     </a:solidFill>
@@ -11714,7 +11728,7 @@
               </a:ln>
               <a:extLst>
                 <a:ext uri="{91240B29-F687-4f45-9708-019B960494DF}">
-                  <a14:hiddenLine xmlns="" xmlns:a14="http://schemas.microsoft.com/office/drawing/2010/main" w="9525">
+                  <a14:hiddenLine xmlns:a14="http://schemas.microsoft.com/office/drawing/2010/main" xmlns="" w="9525">
                     <a:solidFill>
                       <a:srgbClr val="000000"/>
                     </a:solidFill>
@@ -11804,7 +11818,7 @@
               </a:ln>
               <a:extLst>
                 <a:ext uri="{91240B29-F687-4f45-9708-019B960494DF}">
-                  <a14:hiddenLine xmlns="" xmlns:a14="http://schemas.microsoft.com/office/drawing/2010/main" w="9525">
+                  <a14:hiddenLine xmlns:a14="http://schemas.microsoft.com/office/drawing/2010/main" xmlns="" w="9525">
                     <a:solidFill>
                       <a:srgbClr val="000000"/>
                     </a:solidFill>
@@ -11838,7 +11852,7 @@
               </a:ln>
               <a:extLst>
                 <a:ext uri="{91240B29-F687-4f45-9708-019B960494DF}">
-                  <a14:hiddenLine xmlns="" xmlns:a14="http://schemas.microsoft.com/office/drawing/2010/main" w="9525">
+                  <a14:hiddenLine xmlns:a14="http://schemas.microsoft.com/office/drawing/2010/main" xmlns="" w="9525">
                     <a:solidFill>
                       <a:srgbClr val="000000"/>
                     </a:solidFill>
@@ -11988,7 +12002,7 @@
             <a:fld id="{48A87A34-81AB-432B-8DAE-1953F412C126}" type="datetimeFigureOut">
               <a:rPr lang="en-US" smtClean="0"/>
               <a:pPr/>
-              <a:t>11/7/2023</a:t>
+              <a:t>11/9/2023</a:t>
             </a:fld>
             <a:endParaRPr lang="en-US" dirty="0"/>
           </a:p>
@@ -12141,13 +12155,7 @@
           <a:solidFill>
             <a:schemeClr val="tx1"/>
           </a:solidFill>
-          <a:effectLst>
-            <a:outerShdw blurRad="152400" dist="38100" dir="2700000" algn="tl">
-              <a:srgbClr val="000000">
-                <a:alpha val="36000"/>
-              </a:srgbClr>
-            </a:outerShdw>
-          </a:effectLst>
+          <a:effectLst/>
           <a:latin typeface="PT Root UI Light" panose="020B0203020202020204" pitchFamily="34" charset="-52"/>
           <a:ea typeface="PT Root UI Light" panose="020B0203020202020204" pitchFamily="34" charset="-52"/>
           <a:cs typeface="+mn-cs"/>
@@ -12167,13 +12175,7 @@
           <a:solidFill>
             <a:schemeClr val="tx1"/>
           </a:solidFill>
-          <a:effectLst>
-            <a:outerShdw blurRad="152400" dist="38100" dir="2700000" algn="tl">
-              <a:srgbClr val="000000">
-                <a:alpha val="36000"/>
-              </a:srgbClr>
-            </a:outerShdw>
-          </a:effectLst>
+          <a:effectLst/>
           <a:latin typeface="PT Root UI Light" panose="020B0203020202020204" pitchFamily="34" charset="-52"/>
           <a:ea typeface="PT Root UI Light" panose="020B0203020202020204" pitchFamily="34" charset="-52"/>
           <a:cs typeface="+mn-cs"/>
@@ -12193,13 +12195,7 @@
           <a:solidFill>
             <a:schemeClr val="tx1"/>
           </a:solidFill>
-          <a:effectLst>
-            <a:outerShdw blurRad="152400" dist="38100" dir="2700000" algn="tl">
-              <a:srgbClr val="000000">
-                <a:alpha val="36000"/>
-              </a:srgbClr>
-            </a:outerShdw>
-          </a:effectLst>
+          <a:effectLst/>
           <a:latin typeface="PT Root UI Light" panose="020B0203020202020204" pitchFamily="34" charset="-52"/>
           <a:ea typeface="PT Root UI Light" panose="020B0203020202020204" pitchFamily="34" charset="-52"/>
           <a:cs typeface="+mn-cs"/>
@@ -12219,13 +12215,7 @@
           <a:solidFill>
             <a:schemeClr val="tx1"/>
           </a:solidFill>
-          <a:effectLst>
-            <a:outerShdw blurRad="152400" dist="38100" dir="2700000" algn="tl">
-              <a:srgbClr val="000000">
-                <a:alpha val="36000"/>
-              </a:srgbClr>
-            </a:outerShdw>
-          </a:effectLst>
+          <a:effectLst/>
           <a:latin typeface="PT Root UI Light" panose="020B0203020202020204" pitchFamily="34" charset="-52"/>
           <a:ea typeface="PT Root UI Light" panose="020B0203020202020204" pitchFamily="34" charset="-52"/>
           <a:cs typeface="+mn-cs"/>
@@ -12245,13 +12235,7 @@
           <a:solidFill>
             <a:schemeClr val="tx1"/>
           </a:solidFill>
-          <a:effectLst>
-            <a:outerShdw blurRad="152400" dist="38100" dir="2700000" algn="tl">
-              <a:srgbClr val="000000">
-                <a:alpha val="36000"/>
-              </a:srgbClr>
-            </a:outerShdw>
-          </a:effectLst>
+          <a:effectLst/>
           <a:latin typeface="PT Root UI Light" panose="020B0203020202020204" pitchFamily="34" charset="-52"/>
           <a:ea typeface="PT Root UI Light" panose="020B0203020202020204" pitchFamily="34" charset="-52"/>
           <a:cs typeface="+mn-cs"/>
@@ -12622,6 +12606,459 @@
 </p:sld>
 </file>
 
+<file path=ppt/slides/slide10.xml><?xml version="1.0" encoding="utf-8"?>
+<p:sld xmlns:a="http://schemas.openxmlformats.org/drawingml/2006/main" xmlns:r="http://schemas.openxmlformats.org/officeDocument/2006/relationships" xmlns:p="http://schemas.openxmlformats.org/presentationml/2006/main">
+  <p:cSld>
+    <p:spTree>
+      <p:nvGrpSpPr>
+        <p:cNvPr id="1" name=""/>
+        <p:cNvGrpSpPr/>
+        <p:nvPr/>
+      </p:nvGrpSpPr>
+      <p:grpSpPr>
+        <a:xfrm>
+          <a:off x="0" y="0"/>
+          <a:ext cx="0" cy="0"/>
+          <a:chOff x="0" y="0"/>
+          <a:chExt cx="0" cy="0"/>
+        </a:xfrm>
+      </p:grpSpPr>
+      <p:sp>
+        <p:nvSpPr>
+          <p:cNvPr id="2" name="Заголовок 1"/>
+          <p:cNvSpPr>
+            <a:spLocks noGrp="1"/>
+          </p:cNvSpPr>
+          <p:nvPr>
+            <p:ph type="title"/>
+          </p:nvPr>
+        </p:nvSpPr>
+        <p:spPr/>
+        <p:txBody>
+          <a:bodyPr/>
+          <a:lstStyle/>
+          <a:p>
+            <a:r>
+              <a:rPr lang="ru-RU" dirty="0" err="1" smtClean="0"/>
+              <a:t>Логирование</a:t>
+            </a:r>
+            <a:endParaRPr lang="ru-RU" dirty="0"/>
+          </a:p>
+        </p:txBody>
+      </p:sp>
+      <p:sp>
+        <p:nvSpPr>
+          <p:cNvPr id="3" name="Объект 2"/>
+          <p:cNvSpPr>
+            <a:spLocks noGrp="1"/>
+          </p:cNvSpPr>
+          <p:nvPr>
+            <p:ph idx="1"/>
+          </p:nvPr>
+        </p:nvSpPr>
+        <p:spPr/>
+        <p:txBody>
+          <a:bodyPr>
+            <a:normAutofit fontScale="92500" lnSpcReduction="20000"/>
+          </a:bodyPr>
+          <a:lstStyle/>
+          <a:p>
+            <a:r>
+              <a:rPr lang="ru-RU" dirty="0" smtClean="0">
+                <a:effectLst/>
+              </a:rPr>
+              <a:t>В приложении реализовано сквозное </a:t>
+            </a:r>
+            <a:r>
+              <a:rPr lang="ru-RU" dirty="0" err="1" smtClean="0">
+                <a:effectLst/>
+              </a:rPr>
+              <a:t>логирование</a:t>
+            </a:r>
+            <a:r>
+              <a:rPr lang="ru-RU" dirty="0" smtClean="0">
+                <a:effectLst/>
+              </a:rPr>
+              <a:t>;</a:t>
+            </a:r>
+          </a:p>
+          <a:p>
+            <a:r>
+              <a:rPr lang="ru-RU" dirty="0" smtClean="0">
+                <a:effectLst/>
+              </a:rPr>
+              <a:t>Каждой операции присваивается уникальный идентификатор в формате </a:t>
+            </a:r>
+            <a:r>
+              <a:rPr lang="en-US" dirty="0" smtClean="0">
+                <a:effectLst/>
+              </a:rPr>
+              <a:t>UUID</a:t>
+            </a:r>
+            <a:r>
+              <a:rPr lang="ru-RU" dirty="0" smtClean="0">
+                <a:effectLst/>
+              </a:rPr>
+              <a:t>, а также указывается, какое приложение инициировало запрос;</a:t>
+            </a:r>
+          </a:p>
+          <a:p>
+            <a:r>
+              <a:rPr lang="ru-RU" dirty="0" smtClean="0"/>
+              <a:t>Такой подход позволяет отслеживать статус операции на всех этапах ее выполнения</a:t>
+            </a:r>
+            <a:r>
+              <a:rPr lang="en-US" dirty="0" smtClean="0"/>
+              <a:t>;</a:t>
+            </a:r>
+            <a:endParaRPr lang="ru-RU" dirty="0" smtClean="0"/>
+          </a:p>
+          <a:p>
+            <a:pPr marL="228600" lvl="1">
+              <a:spcBef>
+                <a:spcPts val="1000"/>
+              </a:spcBef>
+            </a:pPr>
+            <a:r>
+              <a:rPr lang="ru-RU" dirty="0" smtClean="0"/>
+              <a:t>Запись лога происходит в классе </a:t>
+            </a:r>
+            <a:r>
+              <a:rPr lang="en-US" dirty="0" err="1" smtClean="0"/>
+              <a:t>IncomingRequestLogging</a:t>
+            </a:r>
+            <a:r>
+              <a:rPr lang="ru-RU" dirty="0" smtClean="0"/>
+              <a:t>, перехватчике </a:t>
+            </a:r>
+            <a:r>
+              <a:rPr lang="en-US" dirty="0" smtClean="0"/>
+              <a:t>http-</a:t>
+            </a:r>
+            <a:r>
+              <a:rPr lang="ru-RU" dirty="0" smtClean="0"/>
+              <a:t>запросов; метод </a:t>
+            </a:r>
+            <a:r>
+              <a:rPr lang="en-US" dirty="0" err="1" smtClean="0"/>
+              <a:t>doFilter</a:t>
+            </a:r>
+            <a:r>
+              <a:rPr lang="ru-RU" dirty="0" smtClean="0"/>
+              <a:t> «ловит» входящий </a:t>
+            </a:r>
+            <a:r>
+              <a:rPr lang="en-US" dirty="0" smtClean="0"/>
+              <a:t>http-</a:t>
+            </a:r>
+            <a:r>
+              <a:rPr lang="ru-RU" dirty="0" smtClean="0"/>
+              <a:t>запрос, читает его данные (заголовки, тело и пр.) и запускает обработку, фиксируя продолжительность и другие параметры;</a:t>
+            </a:r>
+            <a:endParaRPr lang="en-US" dirty="0" smtClean="0"/>
+          </a:p>
+          <a:p>
+            <a:pPr marL="228600" lvl="1">
+              <a:spcBef>
+                <a:spcPts val="1000"/>
+              </a:spcBef>
+            </a:pPr>
+            <a:r>
+              <a:rPr lang="ru-RU" dirty="0" smtClean="0"/>
+              <a:t>Также для записи в лог разработан класс </a:t>
+            </a:r>
+            <a:r>
+              <a:rPr lang="en-US" dirty="0" err="1" smtClean="0"/>
+              <a:t>LogWriter</a:t>
+            </a:r>
+            <a:r>
+              <a:rPr lang="ru-RU" dirty="0" smtClean="0"/>
+              <a:t>, реализующий технологию </a:t>
+            </a:r>
+            <a:r>
+              <a:rPr lang="en-US" dirty="0" smtClean="0"/>
+              <a:t>AOP</a:t>
+            </a:r>
+            <a:r>
+              <a:rPr lang="ru-RU" dirty="0" smtClean="0"/>
+              <a:t>; </a:t>
+            </a:r>
+            <a:r>
+              <a:rPr lang="ru-RU" dirty="0" err="1" smtClean="0"/>
+              <a:t>логируются</a:t>
+            </a:r>
+            <a:r>
+              <a:rPr lang="ru-RU" dirty="0" smtClean="0"/>
+              <a:t> методы, помеченные аннотацией </a:t>
+            </a:r>
+            <a:r>
+              <a:rPr lang="en-US" dirty="0" smtClean="0"/>
+              <a:t>@Method</a:t>
+            </a:r>
+            <a:r>
+              <a:rPr lang="ru-RU" dirty="0" smtClean="0"/>
+              <a:t>(</a:t>
+            </a:r>
+            <a:r>
+              <a:rPr lang="en-US" dirty="0" smtClean="0"/>
+              <a:t>name = “…”)</a:t>
+            </a:r>
+            <a:r>
+              <a:rPr lang="ru-RU" dirty="0" smtClean="0"/>
+              <a:t>;</a:t>
+            </a:r>
+            <a:endParaRPr lang="en-US" dirty="0" smtClean="0">
+              <a:effectLst/>
+            </a:endParaRPr>
+          </a:p>
+          <a:p>
+            <a:pPr marL="228600" lvl="1">
+              <a:spcBef>
+                <a:spcPts val="1000"/>
+              </a:spcBef>
+            </a:pPr>
+            <a:r>
+              <a:rPr lang="ru-RU" dirty="0" smtClean="0">
+                <a:effectLst/>
+              </a:rPr>
+              <a:t>Для записи логов используется </a:t>
+            </a:r>
+            <a:r>
+              <a:rPr lang="ru-RU" dirty="0" err="1" smtClean="0">
+                <a:effectLst/>
+              </a:rPr>
+              <a:t>фреймворк</a:t>
+            </a:r>
+            <a:r>
+              <a:rPr lang="ru-RU" dirty="0" smtClean="0">
+                <a:effectLst/>
+              </a:rPr>
+              <a:t> </a:t>
+            </a:r>
+            <a:r>
+              <a:rPr lang="en-US" dirty="0" err="1" smtClean="0">
+                <a:effectLst/>
+              </a:rPr>
+              <a:t>Logback</a:t>
+            </a:r>
+            <a:r>
+              <a:rPr lang="en-US" dirty="0" smtClean="0">
+                <a:effectLst/>
+              </a:rPr>
+              <a:t>;</a:t>
+            </a:r>
+          </a:p>
+          <a:p>
+            <a:pPr marL="228600" lvl="1">
+              <a:spcBef>
+                <a:spcPts val="1000"/>
+              </a:spcBef>
+            </a:pPr>
+            <a:r>
+              <a:rPr lang="ru-RU" dirty="0" smtClean="0">
+                <a:effectLst/>
+              </a:rPr>
+              <a:t>Сбор и анализ логов выполняется в стеке </a:t>
+            </a:r>
+            <a:r>
+              <a:rPr lang="en-US" sz="1800" dirty="0"/>
+              <a:t>ELK (</a:t>
+            </a:r>
+            <a:r>
+              <a:rPr lang="en-US" sz="1800" dirty="0" err="1"/>
+              <a:t>ElasticSearch</a:t>
+            </a:r>
+            <a:r>
+              <a:rPr lang="en-US" sz="1800" dirty="0"/>
+              <a:t> + </a:t>
+            </a:r>
+            <a:r>
+              <a:rPr lang="en-US" sz="1800" dirty="0" err="1"/>
+              <a:t>Kibana</a:t>
+            </a:r>
+            <a:r>
+              <a:rPr lang="en-US" sz="1800" dirty="0"/>
+              <a:t> + </a:t>
+            </a:r>
+            <a:r>
+              <a:rPr lang="en-US" sz="1800" dirty="0" err="1"/>
+              <a:t>FileBeat</a:t>
+            </a:r>
+            <a:r>
+              <a:rPr lang="en-US" sz="1800" dirty="0" smtClean="0"/>
+              <a:t>)</a:t>
+            </a:r>
+            <a:r>
+              <a:rPr lang="ru-RU" sz="1800" dirty="0" smtClean="0"/>
+              <a:t>.</a:t>
+            </a:r>
+            <a:endParaRPr lang="ru-RU" sz="1800" dirty="0"/>
+          </a:p>
+          <a:p>
+            <a:pPr marL="0" indent="0">
+              <a:buNone/>
+            </a:pPr>
+            <a:endParaRPr lang="ru-RU" dirty="0">
+              <a:effectLst/>
+            </a:endParaRPr>
+          </a:p>
+        </p:txBody>
+      </p:sp>
+    </p:spTree>
+    <p:extLst>
+      <p:ext uri="{BB962C8B-B14F-4D97-AF65-F5344CB8AC3E}">
+        <p14:creationId xmlns:p14="http://schemas.microsoft.com/office/powerpoint/2010/main" val="2991389786"/>
+      </p:ext>
+    </p:extLst>
+  </p:cSld>
+  <p:clrMapOvr>
+    <a:masterClrMapping/>
+  </p:clrMapOvr>
+</p:sld>
+</file>
+
+<file path=ppt/slides/slide11.xml><?xml version="1.0" encoding="utf-8"?>
+<p:sld xmlns:a="http://schemas.openxmlformats.org/drawingml/2006/main" xmlns:r="http://schemas.openxmlformats.org/officeDocument/2006/relationships" xmlns:p="http://schemas.openxmlformats.org/presentationml/2006/main">
+  <p:cSld>
+    <p:spTree>
+      <p:nvGrpSpPr>
+        <p:cNvPr id="1" name=""/>
+        <p:cNvGrpSpPr/>
+        <p:nvPr/>
+      </p:nvGrpSpPr>
+      <p:grpSpPr>
+        <a:xfrm>
+          <a:off x="0" y="0"/>
+          <a:ext cx="0" cy="0"/>
+          <a:chOff x="0" y="0"/>
+          <a:chExt cx="0" cy="0"/>
+        </a:xfrm>
+      </p:grpSpPr>
+      <p:sp>
+        <p:nvSpPr>
+          <p:cNvPr id="3" name="Заголовок 2"/>
+          <p:cNvSpPr>
+            <a:spLocks noGrp="1"/>
+          </p:cNvSpPr>
+          <p:nvPr>
+            <p:ph type="title"/>
+          </p:nvPr>
+        </p:nvSpPr>
+        <p:spPr/>
+        <p:txBody>
+          <a:bodyPr/>
+          <a:lstStyle/>
+          <a:p>
+            <a:r>
+              <a:rPr lang="ru-RU" dirty="0" smtClean="0"/>
+              <a:t>Контакты</a:t>
+            </a:r>
+            <a:endParaRPr lang="ru-RU" dirty="0"/>
+          </a:p>
+        </p:txBody>
+      </p:sp>
+      <p:sp>
+        <p:nvSpPr>
+          <p:cNvPr id="4" name="Объект 3"/>
+          <p:cNvSpPr>
+            <a:spLocks noGrp="1"/>
+          </p:cNvSpPr>
+          <p:nvPr>
+            <p:ph idx="1"/>
+          </p:nvPr>
+        </p:nvSpPr>
+        <p:spPr/>
+        <p:txBody>
+          <a:bodyPr/>
+          <a:lstStyle/>
+          <a:p>
+            <a:pPr marL="0" indent="0">
+              <a:buNone/>
+            </a:pPr>
+            <a:r>
+              <a:rPr lang="ru-RU" dirty="0" smtClean="0"/>
+              <a:t>Разработчик: Тищенко Д.Ю.</a:t>
+            </a:r>
+            <a:r>
+              <a:rPr lang="en-US" dirty="0" smtClean="0"/>
+              <a:t> (mailto: tischenko.prg@gmail.com)</a:t>
+            </a:r>
+            <a:endParaRPr lang="ru-RU" dirty="0"/>
+          </a:p>
+        </p:txBody>
+      </p:sp>
+    </p:spTree>
+    <p:extLst>
+      <p:ext uri="{BB962C8B-B14F-4D97-AF65-F5344CB8AC3E}">
+        <p14:creationId xmlns:p14="http://schemas.microsoft.com/office/powerpoint/2010/main" val="2904894569"/>
+      </p:ext>
+    </p:extLst>
+  </p:cSld>
+  <p:clrMapOvr>
+    <a:masterClrMapping/>
+  </p:clrMapOvr>
+</p:sld>
+</file>
+
+<file path=ppt/slides/slide12.xml><?xml version="1.0" encoding="utf-8"?>
+<p:sld xmlns:a="http://schemas.openxmlformats.org/drawingml/2006/main" xmlns:r="http://schemas.openxmlformats.org/officeDocument/2006/relationships" xmlns:p="http://schemas.openxmlformats.org/presentationml/2006/main">
+  <p:cSld>
+    <p:spTree>
+      <p:nvGrpSpPr>
+        <p:cNvPr id="1" name=""/>
+        <p:cNvGrpSpPr/>
+        <p:nvPr/>
+      </p:nvGrpSpPr>
+      <p:grpSpPr>
+        <a:xfrm>
+          <a:off x="0" y="0"/>
+          <a:ext cx="0" cy="0"/>
+          <a:chOff x="0" y="0"/>
+          <a:chExt cx="0" cy="0"/>
+        </a:xfrm>
+      </p:grpSpPr>
+      <p:sp>
+        <p:nvSpPr>
+          <p:cNvPr id="4" name="Заголовок 3"/>
+          <p:cNvSpPr>
+            <a:spLocks noGrp="1"/>
+          </p:cNvSpPr>
+          <p:nvPr>
+            <p:ph type="title"/>
+          </p:nvPr>
+        </p:nvSpPr>
+        <p:spPr>
+          <a:xfrm>
+            <a:off x="1141413" y="2186060"/>
+            <a:ext cx="9905998" cy="1478570"/>
+          </a:xfrm>
+        </p:spPr>
+        <p:txBody>
+          <a:bodyPr/>
+          <a:lstStyle/>
+          <a:p>
+            <a:pPr algn="ctr"/>
+            <a:r>
+              <a:rPr lang="ru-RU" dirty="0" smtClean="0"/>
+              <a:t>Спасибо за внимание!</a:t>
+            </a:r>
+            <a:endParaRPr lang="ru-RU" dirty="0"/>
+          </a:p>
+        </p:txBody>
+      </p:sp>
+    </p:spTree>
+    <p:extLst>
+      <p:ext uri="{BB962C8B-B14F-4D97-AF65-F5344CB8AC3E}">
+        <p14:creationId xmlns:p14="http://schemas.microsoft.com/office/powerpoint/2010/main" val="2015680251"/>
+      </p:ext>
+    </p:extLst>
+  </p:cSld>
+  <p:clrMapOvr>
+    <a:masterClrMapping/>
+  </p:clrMapOvr>
+</p:sld>
+</file>
+
 <file path=ppt/slides/slide2.xml><?xml version="1.0" encoding="utf-8"?>
 <p:sld xmlns:a="http://schemas.openxmlformats.org/drawingml/2006/main" xmlns:r="http://schemas.openxmlformats.org/officeDocument/2006/relationships" xmlns:p="http://schemas.openxmlformats.org/presentationml/2006/main">
   <p:cSld>
@@ -12670,7 +13107,11 @@
           <a:p>
             <a:r>
               <a:rPr lang="ru-RU" sz="3200" dirty="0" smtClean="0"/>
-              <a:t>Общие сведения о приложении</a:t>
+              <a:t>Общие </a:t>
+            </a:r>
+            <a:r>
+              <a:rPr lang="ru-RU" sz="3200" dirty="0" smtClean="0"/>
+              <a:t>сведения</a:t>
             </a:r>
             <a:endParaRPr lang="ru-RU" sz="3200" dirty="0"/>
           </a:p>
@@ -12697,32 +13138,46 @@
           <a:lstStyle/>
           <a:p>
             <a:r>
-              <a:rPr lang="ru-RU" dirty="0" smtClean="0"/>
+              <a:rPr lang="ru-RU" dirty="0" smtClean="0">
+                <a:effectLst/>
+              </a:rPr>
               <a:t>Приложение «</a:t>
             </a:r>
             <a:r>
-              <a:rPr lang="en-US" dirty="0" smtClean="0"/>
+              <a:rPr lang="en-US" dirty="0" smtClean="0">
+                <a:effectLst/>
+              </a:rPr>
               <a:t>Grooming-salon</a:t>
             </a:r>
             <a:r>
-              <a:rPr lang="ru-RU" dirty="0" smtClean="0"/>
+              <a:rPr lang="ru-RU" dirty="0" smtClean="0">
+                <a:effectLst/>
+              </a:rPr>
               <a:t>» предназначено для регистрации и обработки заявок Клиентов на услуги </a:t>
             </a:r>
             <a:r>
-              <a:rPr lang="ru-RU" dirty="0" err="1" smtClean="0"/>
+              <a:rPr lang="ru-RU" dirty="0" err="1" smtClean="0">
+                <a:effectLst/>
+              </a:rPr>
               <a:t>груминга</a:t>
             </a:r>
             <a:r>
-              <a:rPr lang="ru-RU" dirty="0" smtClean="0"/>
+              <a:rPr lang="ru-RU" dirty="0" smtClean="0">
+                <a:effectLst/>
+              </a:rPr>
               <a:t>;</a:t>
             </a:r>
           </a:p>
           <a:p>
             <a:r>
-              <a:rPr lang="ru-RU" dirty="0" smtClean="0"/>
+              <a:rPr lang="ru-RU" dirty="0" smtClean="0">
+                <a:effectLst/>
+              </a:rPr>
               <a:t>Приложение состоит из базы данных и трех программных модулей (сервисов): «Клиент», «Мастер», «Администратор»;</a:t>
             </a:r>
-            <a:endParaRPr lang="ru-RU" dirty="0"/>
+            <a:endParaRPr lang="ru-RU" dirty="0">
+              <a:effectLst/>
+            </a:endParaRPr>
           </a:p>
         </p:txBody>
       </p:sp>
@@ -12802,19 +13257,16 @@
         <p:spPr>
           <a:xfrm>
             <a:off x="1141413" y="2249487"/>
-            <a:ext cx="7781697" cy="3541714"/>
+            <a:ext cx="9480323" cy="3541714"/>
           </a:xfrm>
         </p:spPr>
         <p:txBody>
           <a:bodyPr>
-            <a:normAutofit/>
+            <a:normAutofit fontScale="92500" lnSpcReduction="10000"/>
           </a:bodyPr>
           <a:lstStyle/>
           <a:p>
-            <a:pPr lvl="0">
-              <a:buFont typeface="PT Root UI Light" panose="020B0203020202020204" pitchFamily="34" charset="-52"/>
-              <a:buChar char="‣"/>
-            </a:pPr>
+            <a:pPr lvl="0"/>
             <a:r>
               <a:rPr lang="ru-RU" sz="1800" dirty="0">
                 <a:effectLst/>
@@ -12824,7 +13276,7 @@
               <a:t>Язык программирования – </a:t>
             </a:r>
             <a:r>
-              <a:rPr lang="en-US" sz="1800" dirty="0">
+              <a:rPr lang="en-US" sz="1800" dirty="0" smtClean="0">
                 <a:effectLst/>
                 <a:latin typeface="PT Root UI Light" panose="020B0203020202020204" pitchFamily="34" charset="-52"/>
                 <a:ea typeface="PT Root UI Light" panose="020B0203020202020204" pitchFamily="34" charset="-52"/>
@@ -12832,19 +13284,21 @@
               <a:t>Java</a:t>
             </a:r>
             <a:r>
-              <a:rPr lang="ru-RU" sz="1800" dirty="0">
+              <a:rPr lang="ru-RU" sz="1800" dirty="0" smtClean="0">
                 <a:effectLst/>
                 <a:latin typeface="PT Root UI Light" panose="020B0203020202020204" pitchFamily="34" charset="-52"/>
                 <a:ea typeface="PT Root UI Light" panose="020B0203020202020204" pitchFamily="34" charset="-52"/>
               </a:rPr>
-              <a:t>;</a:t>
-            </a:r>
-          </a:p>
-          <a:p>
-            <a:pPr lvl="0">
-              <a:buFont typeface="PT Root UI Light" panose="020B0203020202020204" pitchFamily="34" charset="-52"/>
-              <a:buChar char="‣"/>
-            </a:pPr>
+              <a:t> 17;</a:t>
+            </a:r>
+            <a:endParaRPr lang="ru-RU" sz="1800" dirty="0">
+              <a:effectLst/>
+              <a:latin typeface="PT Root UI Light" panose="020B0203020202020204" pitchFamily="34" charset="-52"/>
+              <a:ea typeface="PT Root UI Light" panose="020B0203020202020204" pitchFamily="34" charset="-52"/>
+            </a:endParaRPr>
+          </a:p>
+          <a:p>
+            <a:pPr lvl="0"/>
             <a:r>
               <a:rPr lang="ru-RU" sz="1800" dirty="0">
                 <a:effectLst/>
@@ -12865,7 +13319,47 @@
                 <a:latin typeface="PT Root UI Light" panose="020B0203020202020204" pitchFamily="34" charset="-52"/>
                 <a:ea typeface="PT Root UI Light" panose="020B0203020202020204" pitchFamily="34" charset="-52"/>
               </a:rPr>
-              <a:t>Spring Boot Web;</a:t>
+              <a:t>Spring Boot </a:t>
+            </a:r>
+            <a:r>
+              <a:rPr lang="en-US" sz="1800" dirty="0" smtClean="0">
+                <a:effectLst/>
+                <a:latin typeface="PT Root UI Light" panose="020B0203020202020204" pitchFamily="34" charset="-52"/>
+                <a:ea typeface="PT Root UI Light" panose="020B0203020202020204" pitchFamily="34" charset="-52"/>
+              </a:rPr>
+              <a:t>Web (</a:t>
+            </a:r>
+            <a:r>
+              <a:rPr lang="ru-RU" sz="1800" dirty="0" smtClean="0">
+                <a:effectLst/>
+                <a:latin typeface="PT Root UI Light" panose="020B0203020202020204" pitchFamily="34" charset="-52"/>
+                <a:ea typeface="PT Root UI Light" panose="020B0203020202020204" pitchFamily="34" charset="-52"/>
+              </a:rPr>
+              <a:t>контейнер </a:t>
+            </a:r>
+            <a:r>
+              <a:rPr lang="ru-RU" sz="1800" dirty="0" err="1" smtClean="0">
+                <a:effectLst/>
+                <a:latin typeface="PT Root UI Light" panose="020B0203020202020204" pitchFamily="34" charset="-52"/>
+                <a:ea typeface="PT Root UI Light" panose="020B0203020202020204" pitchFamily="34" charset="-52"/>
+              </a:rPr>
+              <a:t>сервлетов</a:t>
+            </a:r>
+            <a:r>
+              <a:rPr lang="ru-RU" sz="1800" dirty="0" smtClean="0">
+                <a:effectLst/>
+                <a:latin typeface="PT Root UI Light" panose="020B0203020202020204" pitchFamily="34" charset="-52"/>
+                <a:ea typeface="PT Root UI Light" panose="020B0203020202020204" pitchFamily="34" charset="-52"/>
+              </a:rPr>
+              <a:t> - </a:t>
+            </a:r>
+            <a:r>
+              <a:rPr lang="en-US" sz="1800" dirty="0" smtClean="0">
+                <a:effectLst/>
+                <a:latin typeface="PT Root UI Light" panose="020B0203020202020204" pitchFamily="34" charset="-52"/>
+                <a:ea typeface="PT Root UI Light" panose="020B0203020202020204" pitchFamily="34" charset="-52"/>
+              </a:rPr>
+              <a:t>Jetty);</a:t>
             </a:r>
             <a:endParaRPr lang="ru-RU" sz="1800" dirty="0">
               <a:effectLst/>
@@ -12971,12 +13465,67 @@
               <a:t>Logback</a:t>
             </a:r>
             <a:r>
-              <a:rPr lang="en-US" sz="1800" dirty="0">
+              <a:rPr lang="en-US" sz="1800" dirty="0" smtClean="0">
                 <a:effectLst/>
                 <a:latin typeface="PT Root UI Light" panose="020B0203020202020204" pitchFamily="34" charset="-52"/>
                 <a:ea typeface="PT Root UI Light" panose="020B0203020202020204" pitchFamily="34" charset="-52"/>
               </a:rPr>
               <a:t>;</a:t>
+            </a:r>
+          </a:p>
+          <a:p>
+            <a:pPr marL="285750" lvl="1" indent="-285750">
+              <a:spcBef>
+                <a:spcPts val="1200"/>
+              </a:spcBef>
+            </a:pPr>
+            <a:r>
+              <a:rPr lang="ru-RU" sz="1800" dirty="0" smtClean="0">
+                <a:effectLst/>
+              </a:rPr>
+              <a:t>Для анализа логов используется стек </a:t>
+            </a:r>
+            <a:r>
+              <a:rPr lang="en-US" sz="1800" dirty="0" smtClean="0">
+                <a:effectLst/>
+              </a:rPr>
+              <a:t>ELK (</a:t>
+            </a:r>
+            <a:r>
+              <a:rPr lang="en-US" sz="1800" dirty="0" err="1" smtClean="0">
+                <a:effectLst/>
+              </a:rPr>
+              <a:t>ElasticSearch</a:t>
+            </a:r>
+            <a:r>
+              <a:rPr lang="en-US" sz="1800" dirty="0" smtClean="0">
+                <a:effectLst/>
+              </a:rPr>
+              <a:t> + </a:t>
+            </a:r>
+            <a:r>
+              <a:rPr lang="en-US" sz="1800" dirty="0" err="1" smtClean="0">
+                <a:effectLst/>
+              </a:rPr>
+              <a:t>Kibana</a:t>
+            </a:r>
+            <a:r>
+              <a:rPr lang="en-US" sz="1800" dirty="0" smtClean="0">
+                <a:effectLst/>
+              </a:rPr>
+              <a:t> + </a:t>
+            </a:r>
+            <a:r>
+              <a:rPr lang="en-US" sz="1800" dirty="0" err="1" smtClean="0">
+                <a:effectLst/>
+              </a:rPr>
+              <a:t>FileBeat</a:t>
+            </a:r>
+            <a:r>
+              <a:rPr lang="en-US" sz="1800" dirty="0" smtClean="0">
+                <a:effectLst/>
+              </a:rPr>
+              <a:t>)</a:t>
             </a:r>
             <a:endParaRPr lang="ru-RU" sz="1800" dirty="0">
               <a:effectLst/>
@@ -13039,7 +13588,35 @@
                 <a:latin typeface="PT Root UI Light" panose="020B0203020202020204" pitchFamily="34" charset="-52"/>
                 <a:ea typeface="PT Root UI Light" panose="020B0203020202020204" pitchFamily="34" charset="-52"/>
               </a:rPr>
-              <a:t>Модуль «Клиент»</a:t>
+              <a:t>Модуль «Клиент</a:t>
+            </a:r>
+            <a:r>
+              <a:rPr lang="ru-RU" dirty="0" smtClean="0">
+                <a:latin typeface="PT Root UI Light" panose="020B0203020202020204" pitchFamily="34" charset="-52"/>
+                <a:ea typeface="PT Root UI Light" panose="020B0203020202020204" pitchFamily="34" charset="-52"/>
+              </a:rPr>
+              <a:t>»</a:t>
+            </a:r>
+            <a:r>
+              <a:rPr lang="en-US" dirty="0" smtClean="0">
+                <a:latin typeface="PT Root UI Light" panose="020B0203020202020204" pitchFamily="34" charset="-52"/>
+                <a:ea typeface="PT Root UI Light" panose="020B0203020202020204" pitchFamily="34" charset="-52"/>
+              </a:rPr>
+              <a:t/>
+            </a:r>
+            <a:br>
+              <a:rPr lang="en-US" dirty="0" smtClean="0">
+                <a:latin typeface="PT Root UI Light" panose="020B0203020202020204" pitchFamily="34" charset="-52"/>
+                <a:ea typeface="PT Root UI Light" panose="020B0203020202020204" pitchFamily="34" charset="-52"/>
+              </a:rPr>
+            </a:br>
+            <a:r>
+              <a:rPr lang="en-US" sz="1800" dirty="0" smtClean="0"/>
+              <a:t>(</a:t>
+            </a:r>
+            <a:r>
+              <a:rPr lang="ru-RU" sz="1800" dirty="0" smtClean="0"/>
+              <a:t>основной функционал)</a:t>
             </a:r>
             <a:endParaRPr lang="ru-RU" dirty="0">
               <a:latin typeface="PT Root UI Light" panose="020B0203020202020204" pitchFamily="34" charset="-52"/>
@@ -13254,7 +13831,28 @@
                 <a:latin typeface="PT Root UI Light" panose="020B0203020202020204" pitchFamily="34" charset="-52"/>
                 <a:ea typeface="PT Root UI Light" panose="020B0203020202020204" pitchFamily="34" charset="-52"/>
               </a:rPr>
-              <a:t>Модуль «Клиент»</a:t>
+              <a:t>Модуль «Клиент</a:t>
+            </a:r>
+            <a:r>
+              <a:rPr lang="ru-RU" dirty="0" smtClean="0">
+                <a:latin typeface="PT Root UI Light" panose="020B0203020202020204" pitchFamily="34" charset="-52"/>
+                <a:ea typeface="PT Root UI Light" panose="020B0203020202020204" pitchFamily="34" charset="-52"/>
+              </a:rPr>
+              <a:t>»</a:t>
+            </a:r>
+            <a:br>
+              <a:rPr lang="ru-RU" dirty="0" smtClean="0">
+                <a:latin typeface="PT Root UI Light" panose="020B0203020202020204" pitchFamily="34" charset="-52"/>
+                <a:ea typeface="PT Root UI Light" panose="020B0203020202020204" pitchFamily="34" charset="-52"/>
+              </a:rPr>
+            </a:br>
+            <a:r>
+              <a:rPr lang="en-US" sz="1800" dirty="0" smtClean="0"/>
+              <a:t>(</a:t>
+            </a:r>
+            <a:r>
+              <a:rPr lang="ru-RU" sz="1800" dirty="0" smtClean="0"/>
+              <a:t>возможное расширение функционала)</a:t>
             </a:r>
             <a:endParaRPr lang="ru-RU" dirty="0">
               <a:latin typeface="PT Root UI Light" panose="020B0203020202020204" pitchFamily="34" charset="-52"/>
@@ -13276,7 +13874,7 @@
         <p:spPr>
           <a:xfrm>
             <a:off x="1141413" y="2097088"/>
-            <a:ext cx="9905999" cy="3532188"/>
+            <a:ext cx="9905999" cy="2115683"/>
           </a:xfrm>
         </p:spPr>
         <p:txBody>
@@ -13329,27 +13927,20 @@
               </a:lnSpc>
             </a:pPr>
             <a:r>
+              <a:rPr lang="ru-RU" sz="1800" dirty="0" smtClean="0">
+                <a:effectLst/>
+                <a:latin typeface="PT Root UI Light" panose="020B0203020202020204" pitchFamily="34" charset="-52"/>
+                <a:ea typeface="PT Root UI Light" panose="020B0203020202020204" pitchFamily="34" charset="-52"/>
+              </a:rPr>
+              <a:t>Просмотр </a:t>
+            </a:r>
+            <a:r>
               <a:rPr lang="ru-RU" sz="1800" dirty="0">
                 <a:effectLst/>
                 <a:latin typeface="PT Root UI Light" panose="020B0203020202020204" pitchFamily="34" charset="-52"/>
                 <a:ea typeface="PT Root UI Light" panose="020B0203020202020204" pitchFamily="34" charset="-52"/>
               </a:rPr>
-              <a:t>Предоплата услуги;</a:t>
-            </a:r>
-          </a:p>
-          <a:p>
-            <a:pPr lvl="0">
-              <a:lnSpc>
-                <a:spcPct val="100000"/>
-              </a:lnSpc>
-            </a:pPr>
-            <a:r>
-              <a:rPr lang="ru-RU" sz="1800" dirty="0">
-                <a:effectLst/>
-                <a:latin typeface="PT Root UI Light" panose="020B0203020202020204" pitchFamily="34" charset="-52"/>
-                <a:ea typeface="PT Root UI Light" panose="020B0203020202020204" pitchFamily="34" charset="-52"/>
-              </a:rPr>
-              <a:t>Просмотр истории полученных услуг;</a:t>
+              <a:t>истории полученных услуг;</a:t>
             </a:r>
           </a:p>
           <a:p>
@@ -13365,21 +13956,6 @@
                 <a:ea typeface="PT Root UI Light" panose="020B0203020202020204" pitchFamily="34" charset="-52"/>
               </a:rPr>
               <a:t>Написание отзыва о качестве оказанной услуги.</a:t>
-            </a:r>
-          </a:p>
-          <a:p>
-            <a:pPr>
-              <a:lnSpc>
-                <a:spcPct val="100000"/>
-              </a:lnSpc>
-            </a:pPr>
-            <a:r>
-              <a:rPr lang="ru-RU" sz="1800" dirty="0">
-                <a:effectLst/>
-                <a:latin typeface="PT Root UI Light" panose="020B0203020202020204" pitchFamily="34" charset="-52"/>
-                <a:ea typeface="PT Root UI Light" panose="020B0203020202020204" pitchFamily="34" charset="-52"/>
-              </a:rPr>
-              <a:t>Комплектование услуги – добавление к услуге различных опций, выбор «сопутствующих товаров»</a:t>
             </a:r>
           </a:p>
           <a:p>
@@ -13828,7 +14404,7 @@
           <a:p>
             <a:r>
               <a:rPr lang="ru-RU" dirty="0" smtClean="0"/>
-              <a:t>База данных</a:t>
+              <a:t>Взаимодействие</a:t>
             </a:r>
             <a:endParaRPr lang="ru-RU" dirty="0"/>
           </a:p>
@@ -13849,36 +14425,165 @@
           <a:bodyPr/>
           <a:lstStyle/>
           <a:p>
-            <a:pPr marL="0" indent="0">
-              <a:buNone/>
-            </a:pPr>
             <a:r>
               <a:rPr lang="ru-RU" dirty="0" smtClean="0"/>
-              <a:t>Для хранения данных приложения «</a:t>
+              <a:t>Сервисы приложения взаимодействуют между собой с помощью </a:t>
             </a:r>
             <a:r>
               <a:rPr lang="en-US" dirty="0" smtClean="0"/>
-              <a:t>Grooming-salon</a:t>
+              <a:t>http-</a:t>
             </a:r>
             <a:r>
               <a:rPr lang="ru-RU" dirty="0" smtClean="0"/>
-              <a:t>» используется СУБД </a:t>
+              <a:t>запросов;</a:t>
+            </a:r>
+          </a:p>
+          <a:p>
+            <a:r>
+              <a:rPr lang="ru-RU" dirty="0"/>
+              <a:t>Каждый из сервисов приложения имеет свой </a:t>
+            </a:r>
+            <a:r>
+              <a:rPr lang="en-US" dirty="0"/>
+              <a:t>API </a:t>
+            </a:r>
+            <a:r>
+              <a:rPr lang="ru-RU" dirty="0"/>
+              <a:t>для получения и обработки </a:t>
+            </a:r>
+            <a:r>
+              <a:rPr lang="en-US" dirty="0"/>
+              <a:t>http-</a:t>
+            </a:r>
+            <a:r>
+              <a:rPr lang="ru-RU" dirty="0"/>
+              <a:t>запросов;</a:t>
+            </a:r>
+          </a:p>
+          <a:p>
+            <a:r>
+              <a:rPr lang="ru-RU" dirty="0" smtClean="0"/>
+              <a:t>Каждому </a:t>
+            </a:r>
+            <a:r>
+              <a:rPr lang="en-US" dirty="0" smtClean="0"/>
+              <a:t>http-</a:t>
+            </a:r>
+            <a:r>
+              <a:rPr lang="ru-RU" dirty="0" smtClean="0"/>
+              <a:t>запросу </a:t>
+            </a:r>
+            <a:r>
+              <a:rPr lang="ru-RU" dirty="0"/>
+              <a:t>присваивается уникальный идентификатор </a:t>
+            </a:r>
+            <a:r>
+              <a:rPr lang="ru-RU" dirty="0" smtClean="0"/>
+              <a:t>(</a:t>
+            </a:r>
+            <a:r>
+              <a:rPr lang="en-US" dirty="0" smtClean="0"/>
+              <a:t>TRANSACT-ID</a:t>
+            </a:r>
+            <a:r>
+              <a:rPr lang="ru-RU" dirty="0" smtClean="0"/>
+              <a:t>) в </a:t>
+            </a:r>
+            <a:r>
+              <a:rPr lang="ru-RU" dirty="0"/>
+              <a:t>формате </a:t>
+            </a:r>
+            <a:r>
+              <a:rPr lang="en-US" dirty="0"/>
+              <a:t>UUID</a:t>
+            </a:r>
+            <a:r>
+              <a:rPr lang="ru-RU" dirty="0"/>
+              <a:t>, а также указывается, какое приложение инициировало </a:t>
+            </a:r>
+            <a:r>
+              <a:rPr lang="ru-RU" dirty="0" smtClean="0"/>
+              <a:t>запрос</a:t>
+            </a:r>
+            <a:r>
+              <a:rPr lang="en-US" dirty="0" smtClean="0"/>
+              <a:t> (SOURCE)</a:t>
+            </a:r>
+            <a:r>
+              <a:rPr lang="ru-RU" dirty="0" smtClean="0"/>
+              <a:t>;</a:t>
+            </a:r>
+          </a:p>
+          <a:p>
+            <a:r>
+              <a:rPr lang="ru-RU" dirty="0" smtClean="0"/>
+              <a:t>Значения </a:t>
+            </a:r>
+            <a:r>
+              <a:rPr lang="en-US" dirty="0" smtClean="0"/>
+              <a:t>TRANSACT-ID </a:t>
+            </a:r>
+            <a:r>
+              <a:rPr lang="ru-RU" dirty="0" smtClean="0"/>
+              <a:t>и</a:t>
+            </a:r>
+            <a:r>
+              <a:rPr lang="en-US" dirty="0" smtClean="0"/>
+              <a:t> SOURCE </a:t>
+            </a:r>
+            <a:r>
+              <a:rPr lang="ru-RU" dirty="0" smtClean="0"/>
+              <a:t>передаются вместе с запросом в заголовках</a:t>
+            </a:r>
+            <a:r>
+              <a:rPr lang="en-US" dirty="0" smtClean="0"/>
+              <a:t> </a:t>
             </a:r>
             <a:r>
               <a:rPr lang="en-US" dirty="0" err="1" smtClean="0"/>
-              <a:t>PostreSQL</a:t>
-            </a:r>
-            <a:r>
-              <a:rPr lang="ru-RU" dirty="0"/>
-              <a:t>.</a:t>
-            </a:r>
+              <a:t>TransactId</a:t>
+            </a:r>
+            <a:r>
+              <a:rPr lang="en-US" dirty="0" smtClean="0"/>
+              <a:t> </a:t>
+            </a:r>
+            <a:r>
+              <a:rPr lang="ru-RU" dirty="0" smtClean="0"/>
+              <a:t>и </a:t>
+            </a:r>
+            <a:r>
+              <a:rPr lang="en-US" dirty="0" smtClean="0"/>
+              <a:t>Source </a:t>
+            </a:r>
+            <a:r>
+              <a:rPr lang="ru-RU" dirty="0" smtClean="0"/>
+              <a:t>соответственно;</a:t>
+            </a:r>
+          </a:p>
+          <a:p>
+            <a:r>
+              <a:rPr lang="ru-RU" dirty="0" smtClean="0"/>
+              <a:t>Каждый запрос </a:t>
+            </a:r>
+            <a:r>
+              <a:rPr lang="ru-RU" dirty="0" err="1" smtClean="0"/>
+              <a:t>логируется</a:t>
+            </a:r>
+            <a:r>
+              <a:rPr lang="ru-RU" dirty="0" smtClean="0"/>
+              <a:t> на всех этапах его обработки.</a:t>
+            </a:r>
+            <a:endParaRPr lang="ru-RU" dirty="0"/>
+          </a:p>
+          <a:p>
+            <a:endParaRPr lang="ru-RU" dirty="0"/>
           </a:p>
         </p:txBody>
       </p:sp>
     </p:spTree>
     <p:extLst>
       <p:ext uri="{BB962C8B-B14F-4D97-AF65-F5344CB8AC3E}">
-        <p14:creationId xmlns:p14="http://schemas.microsoft.com/office/powerpoint/2010/main" val="580293855"/>
+        <p14:creationId xmlns:p14="http://schemas.microsoft.com/office/powerpoint/2010/main" val="468822836"/>
       </p:ext>
     </p:extLst>
   </p:cSld>
@@ -13922,53 +14627,88 @@
           <a:p>
             <a:r>
               <a:rPr lang="ru-RU" dirty="0" smtClean="0"/>
-              <a:t>Схема данных</a:t>
+              <a:t>База данных</a:t>
             </a:r>
             <a:endParaRPr lang="ru-RU" dirty="0"/>
           </a:p>
         </p:txBody>
       </p:sp>
-      <p:pic>
-        <p:nvPicPr>
-          <p:cNvPr id="6" name="Рисунок 5"/>
-          <p:cNvPicPr>
-            <a:picLocks noChangeAspect="1"/>
-          </p:cNvPicPr>
-          <p:nvPr/>
-        </p:nvPicPr>
-        <p:blipFill>
-          <a:blip r:embed="rId2">
-            <a:extLst>
-              <a:ext uri="{28A0092B-C50C-407E-A947-70E740481C1C}">
-                <a14:useLocalDpi xmlns:a14="http://schemas.microsoft.com/office/drawing/2010/main" val="0"/>
-              </a:ext>
-            </a:extLst>
-          </a:blip>
-          <a:stretch>
-            <a:fillRect/>
-          </a:stretch>
-        </p:blipFill>
-        <p:spPr>
-          <a:xfrm>
-            <a:off x="2654772" y="1733550"/>
-            <a:ext cx="6879280" cy="4670500"/>
-          </a:xfrm>
-          <a:prstGeom prst="rect">
-            <a:avLst/>
-          </a:prstGeom>
-          <a:effectLst>
-            <a:outerShdw blurRad="50800" dist="38100" dir="5400000" algn="t" rotWithShape="0">
-              <a:prstClr val="black">
-                <a:alpha val="40000"/>
-              </a:prstClr>
-            </a:outerShdw>
-          </a:effectLst>
-        </p:spPr>
-      </p:pic>
+      <p:sp>
+        <p:nvSpPr>
+          <p:cNvPr id="3" name="Объект 2"/>
+          <p:cNvSpPr>
+            <a:spLocks noGrp="1"/>
+          </p:cNvSpPr>
+          <p:nvPr>
+            <p:ph idx="1"/>
+          </p:nvPr>
+        </p:nvSpPr>
+        <p:spPr/>
+        <p:txBody>
+          <a:bodyPr/>
+          <a:lstStyle/>
+          <a:p>
+            <a:r>
+              <a:rPr lang="ru-RU" dirty="0" smtClean="0"/>
+              <a:t>Для хранения данных приложения «</a:t>
+            </a:r>
+            <a:r>
+              <a:rPr lang="en-US" dirty="0" smtClean="0"/>
+              <a:t>Grooming-salon</a:t>
+            </a:r>
+            <a:r>
+              <a:rPr lang="ru-RU" dirty="0" smtClean="0"/>
+              <a:t>» используется СУБД </a:t>
+            </a:r>
+            <a:r>
+              <a:rPr lang="en-US" dirty="0" err="1" smtClean="0"/>
+              <a:t>PostreSQL</a:t>
+            </a:r>
+            <a:r>
+              <a:rPr lang="en-US" dirty="0" smtClean="0"/>
+              <a:t> 14</a:t>
+            </a:r>
+            <a:r>
+              <a:rPr lang="ru-RU" dirty="0" smtClean="0"/>
+              <a:t>;</a:t>
+            </a:r>
+          </a:p>
+          <a:p>
+            <a:r>
+              <a:rPr lang="ru-RU" dirty="0" smtClean="0"/>
+              <a:t>Контроль целостности данных реализован в БД – первичные и внешние ключи, </a:t>
+            </a:r>
+            <a:r>
+              <a:rPr lang="ru-RU" dirty="0" err="1" smtClean="0"/>
+              <a:t>констрейнты</a:t>
+            </a:r>
+            <a:r>
+              <a:rPr lang="ru-RU" dirty="0" smtClean="0"/>
+              <a:t>;</a:t>
+            </a:r>
+            <a:endParaRPr lang="ru-RU" dirty="0" smtClean="0"/>
+          </a:p>
+          <a:p>
+            <a:r>
+              <a:rPr lang="ru-RU" dirty="0" smtClean="0"/>
+              <a:t>Каждый из сервисов имеет прямой доступ только к своему, ограниченному, набору таблиц и представлений;</a:t>
+            </a:r>
+          </a:p>
+          <a:p>
+            <a:r>
+              <a:rPr lang="ru-RU" dirty="0" smtClean="0"/>
+              <a:t>Если приложению требуются данные из «чужой» таблицы, оно выполняет запрос к соответствующему сервису;</a:t>
+            </a:r>
+          </a:p>
+          <a:p>
+            <a:endParaRPr lang="ru-RU" dirty="0"/>
+          </a:p>
+        </p:txBody>
+      </p:sp>
     </p:spTree>
     <p:extLst>
       <p:ext uri="{BB962C8B-B14F-4D97-AF65-F5344CB8AC3E}">
-        <p14:creationId xmlns:p14="http://schemas.microsoft.com/office/powerpoint/2010/main" val="870636420"/>
+        <p14:creationId xmlns:p14="http://schemas.microsoft.com/office/powerpoint/2010/main" val="580293855"/>
       </p:ext>
     </p:extLst>
   </p:cSld>

</xml_diff>